<commit_message>
Grpahics for Zone 3
Creaeted
Map 1
Map 2
Map 3
Map 4
With tiles,  Numbered correctly

Added Layout for Zone 3
</commit_message>
<xml_diff>
--- a/Graphics/Map/Eldritch Horror Zone Layouts.pptx
+++ b/Graphics/Map/Eldritch Horror Zone Layouts.pptx
@@ -5,7 +5,7 @@
     <p:sldMasterId id="2147483648" r:id="rId1"/>
   </p:sldMasterIdLst>
   <p:notesMasterIdLst>
-    <p:notesMasterId r:id="rId22"/>
+    <p:notesMasterId r:id="rId25"/>
   </p:notesMasterIdLst>
   <p:sldIdLst>
     <p:sldId id="256" r:id="rId2"/>
@@ -26,8 +26,11 @@
     <p:sldId id="268" r:id="rId17"/>
     <p:sldId id="269" r:id="rId18"/>
     <p:sldId id="259" r:id="rId19"/>
-    <p:sldId id="260" r:id="rId20"/>
-    <p:sldId id="261" r:id="rId21"/>
+    <p:sldId id="276" r:id="rId20"/>
+    <p:sldId id="277" r:id="rId21"/>
+    <p:sldId id="278" r:id="rId22"/>
+    <p:sldId id="279" r:id="rId23"/>
+    <p:sldId id="261" r:id="rId24"/>
   </p:sldIdLst>
   <p:sldSz cx="12192000" cy="6858000"/>
   <p:notesSz cx="6858000" cy="9144000"/>
@@ -216,7 +219,7 @@
           <a:p>
             <a:fld id="{8437C733-DF1B-4F14-974A-C7A30185696D}" type="datetimeFigureOut">
               <a:rPr lang="en-GB" smtClean="0"/>
-              <a:t>25/11/2020</a:t>
+              <a:t>30/11/2020</a:t>
             </a:fld>
             <a:endParaRPr lang="en-GB"/>
           </a:p>
@@ -633,7 +636,7 @@
           <a:p>
             <a:fld id="{DBBB96BD-88F3-40EC-94D0-278D310612F6}" type="datetimeFigureOut">
               <a:rPr lang="en-GB" smtClean="0"/>
-              <a:t>25/11/2020</a:t>
+              <a:t>30/11/2020</a:t>
             </a:fld>
             <a:endParaRPr lang="en-GB"/>
           </a:p>
@@ -833,7 +836,7 @@
           <a:p>
             <a:fld id="{DBBB96BD-88F3-40EC-94D0-278D310612F6}" type="datetimeFigureOut">
               <a:rPr lang="en-GB" smtClean="0"/>
-              <a:t>25/11/2020</a:t>
+              <a:t>30/11/2020</a:t>
             </a:fld>
             <a:endParaRPr lang="en-GB"/>
           </a:p>
@@ -1043,7 +1046,7 @@
           <a:p>
             <a:fld id="{DBBB96BD-88F3-40EC-94D0-278D310612F6}" type="datetimeFigureOut">
               <a:rPr lang="en-GB" smtClean="0"/>
-              <a:t>25/11/2020</a:t>
+              <a:t>30/11/2020</a:t>
             </a:fld>
             <a:endParaRPr lang="en-GB"/>
           </a:p>
@@ -1243,7 +1246,7 @@
           <a:p>
             <a:fld id="{DBBB96BD-88F3-40EC-94D0-278D310612F6}" type="datetimeFigureOut">
               <a:rPr lang="en-GB" smtClean="0"/>
-              <a:t>25/11/2020</a:t>
+              <a:t>30/11/2020</a:t>
             </a:fld>
             <a:endParaRPr lang="en-GB"/>
           </a:p>
@@ -1519,7 +1522,7 @@
           <a:p>
             <a:fld id="{DBBB96BD-88F3-40EC-94D0-278D310612F6}" type="datetimeFigureOut">
               <a:rPr lang="en-GB" smtClean="0"/>
-              <a:t>25/11/2020</a:t>
+              <a:t>30/11/2020</a:t>
             </a:fld>
             <a:endParaRPr lang="en-GB"/>
           </a:p>
@@ -1787,7 +1790,7 @@
           <a:p>
             <a:fld id="{DBBB96BD-88F3-40EC-94D0-278D310612F6}" type="datetimeFigureOut">
               <a:rPr lang="en-GB" smtClean="0"/>
-              <a:t>25/11/2020</a:t>
+              <a:t>30/11/2020</a:t>
             </a:fld>
             <a:endParaRPr lang="en-GB"/>
           </a:p>
@@ -2202,7 +2205,7 @@
           <a:p>
             <a:fld id="{DBBB96BD-88F3-40EC-94D0-278D310612F6}" type="datetimeFigureOut">
               <a:rPr lang="en-GB" smtClean="0"/>
-              <a:t>25/11/2020</a:t>
+              <a:t>30/11/2020</a:t>
             </a:fld>
             <a:endParaRPr lang="en-GB"/>
           </a:p>
@@ -2344,7 +2347,7 @@
           <a:p>
             <a:fld id="{DBBB96BD-88F3-40EC-94D0-278D310612F6}" type="datetimeFigureOut">
               <a:rPr lang="en-GB" smtClean="0"/>
-              <a:t>25/11/2020</a:t>
+              <a:t>30/11/2020</a:t>
             </a:fld>
             <a:endParaRPr lang="en-GB"/>
           </a:p>
@@ -2457,7 +2460,7 @@
           <a:p>
             <a:fld id="{DBBB96BD-88F3-40EC-94D0-278D310612F6}" type="datetimeFigureOut">
               <a:rPr lang="en-GB" smtClean="0"/>
-              <a:t>25/11/2020</a:t>
+              <a:t>30/11/2020</a:t>
             </a:fld>
             <a:endParaRPr lang="en-GB"/>
           </a:p>
@@ -2770,7 +2773,7 @@
           <a:p>
             <a:fld id="{DBBB96BD-88F3-40EC-94D0-278D310612F6}" type="datetimeFigureOut">
               <a:rPr lang="en-GB" smtClean="0"/>
-              <a:t>25/11/2020</a:t>
+              <a:t>30/11/2020</a:t>
             </a:fld>
             <a:endParaRPr lang="en-GB"/>
           </a:p>
@@ -3059,7 +3062,7 @@
           <a:p>
             <a:fld id="{DBBB96BD-88F3-40EC-94D0-278D310612F6}" type="datetimeFigureOut">
               <a:rPr lang="en-GB" smtClean="0"/>
-              <a:t>25/11/2020</a:t>
+              <a:t>30/11/2020</a:t>
             </a:fld>
             <a:endParaRPr lang="en-GB"/>
           </a:p>
@@ -3302,7 +3305,7 @@
           <a:p>
             <a:fld id="{DBBB96BD-88F3-40EC-94D0-278D310612F6}" type="datetimeFigureOut">
               <a:rPr lang="en-GB" smtClean="0"/>
-              <a:t>25/11/2020</a:t>
+              <a:t>30/11/2020</a:t>
             </a:fld>
             <a:endParaRPr lang="en-GB"/>
           </a:p>
@@ -9578,7 +9581,7 @@
         <p:spPr>
           <a:xfrm>
             <a:off x="6273848" y="1020712"/>
-            <a:ext cx="1154611" cy="307777"/>
+            <a:ext cx="551882" cy="307777"/>
           </a:xfrm>
           <a:prstGeom prst="rect">
             <a:avLst/>
@@ -9596,7 +9599,7 @@
                 <a:latin typeface="Times New Roman" panose="02020603050405020304" pitchFamily="18" charset="0"/>
                 <a:cs typeface="Times New Roman" panose="02020603050405020304" pitchFamily="18" charset="0"/>
               </a:rPr>
-              <a:t>Tree / Flower</a:t>
+              <a:t>Tree </a:t>
             </a:r>
           </a:p>
         </p:txBody>
@@ -9951,202 +9954,10 @@
       </p:grpSpPr>
       <p:sp>
         <p:nvSpPr>
-          <p:cNvPr id="31" name="Freeform: Shape 30">
-            <a:extLst>
-              <a:ext uri="{FF2B5EF4-FFF2-40B4-BE49-F238E27FC236}">
-                <a16:creationId xmlns:a16="http://schemas.microsoft.com/office/drawing/2014/main" id="{D23DCEBC-8437-4B70-A940-D47E9033EC37}"/>
-              </a:ext>
-            </a:extLst>
-          </p:cNvPr>
-          <p:cNvSpPr/>
-          <p:nvPr/>
-        </p:nvSpPr>
-        <p:spPr>
-          <a:xfrm>
-            <a:off x="1535983" y="1977709"/>
-            <a:ext cx="9413646" cy="3636320"/>
-          </a:xfrm>
-          <a:custGeom>
-            <a:avLst/>
-            <a:gdLst>
-              <a:gd name="connsiteX0" fmla="*/ 6366938 w 9413646"/>
-              <a:gd name="connsiteY0" fmla="*/ 0 h 3636320"/>
-              <a:gd name="connsiteX1" fmla="*/ 6954168 w 9413646"/>
-              <a:gd name="connsiteY1" fmla="*/ 0 h 3636320"/>
-              <a:gd name="connsiteX2" fmla="*/ 6954168 w 9413646"/>
-              <a:gd name="connsiteY2" fmla="*/ 1687977 h 3636320"/>
-              <a:gd name="connsiteX3" fmla="*/ 9413646 w 9413646"/>
-              <a:gd name="connsiteY3" fmla="*/ 1687977 h 3636320"/>
-              <a:gd name="connsiteX4" fmla="*/ 9413646 w 9413646"/>
-              <a:gd name="connsiteY4" fmla="*/ 3214513 h 3636320"/>
-              <a:gd name="connsiteX5" fmla="*/ 7465996 w 9413646"/>
-              <a:gd name="connsiteY5" fmla="*/ 3214513 h 3636320"/>
-              <a:gd name="connsiteX6" fmla="*/ 7465996 w 9413646"/>
-              <a:gd name="connsiteY6" fmla="*/ 3636320 h 3636320"/>
-              <a:gd name="connsiteX7" fmla="*/ 1803380 w 9413646"/>
-              <a:gd name="connsiteY7" fmla="*/ 3636320 h 3636320"/>
-              <a:gd name="connsiteX8" fmla="*/ 1803380 w 9413646"/>
-              <a:gd name="connsiteY8" fmla="*/ 3214513 h 3636320"/>
-              <a:gd name="connsiteX9" fmla="*/ 0 w 9413646"/>
-              <a:gd name="connsiteY9" fmla="*/ 3214513 h 3636320"/>
-              <a:gd name="connsiteX10" fmla="*/ 0 w 9413646"/>
-              <a:gd name="connsiteY10" fmla="*/ 1687977 h 3636320"/>
-              <a:gd name="connsiteX11" fmla="*/ 662425 w 9413646"/>
-              <a:gd name="connsiteY11" fmla="*/ 1687977 h 3636320"/>
-              <a:gd name="connsiteX12" fmla="*/ 662425 w 9413646"/>
-              <a:gd name="connsiteY12" fmla="*/ 1071540 h 3636320"/>
-              <a:gd name="connsiteX13" fmla="*/ 1190931 w 9413646"/>
-              <a:gd name="connsiteY13" fmla="*/ 1071540 h 3636320"/>
-              <a:gd name="connsiteX14" fmla="*/ 1190931 w 9413646"/>
-              <a:gd name="connsiteY14" fmla="*/ 1687977 h 3636320"/>
-              <a:gd name="connsiteX15" fmla="*/ 6366938 w 9413646"/>
-              <a:gd name="connsiteY15" fmla="*/ 1687977 h 3636320"/>
-            </a:gdLst>
-            <a:ahLst/>
-            <a:cxnLst>
-              <a:cxn ang="0">
-                <a:pos x="connsiteX0" y="connsiteY0"/>
-              </a:cxn>
-              <a:cxn ang="0">
-                <a:pos x="connsiteX1" y="connsiteY1"/>
-              </a:cxn>
-              <a:cxn ang="0">
-                <a:pos x="connsiteX2" y="connsiteY2"/>
-              </a:cxn>
-              <a:cxn ang="0">
-                <a:pos x="connsiteX3" y="connsiteY3"/>
-              </a:cxn>
-              <a:cxn ang="0">
-                <a:pos x="connsiteX4" y="connsiteY4"/>
-              </a:cxn>
-              <a:cxn ang="0">
-                <a:pos x="connsiteX5" y="connsiteY5"/>
-              </a:cxn>
-              <a:cxn ang="0">
-                <a:pos x="connsiteX6" y="connsiteY6"/>
-              </a:cxn>
-              <a:cxn ang="0">
-                <a:pos x="connsiteX7" y="connsiteY7"/>
-              </a:cxn>
-              <a:cxn ang="0">
-                <a:pos x="connsiteX8" y="connsiteY8"/>
-              </a:cxn>
-              <a:cxn ang="0">
-                <a:pos x="connsiteX9" y="connsiteY9"/>
-              </a:cxn>
-              <a:cxn ang="0">
-                <a:pos x="connsiteX10" y="connsiteY10"/>
-              </a:cxn>
-              <a:cxn ang="0">
-                <a:pos x="connsiteX11" y="connsiteY11"/>
-              </a:cxn>
-              <a:cxn ang="0">
-                <a:pos x="connsiteX12" y="connsiteY12"/>
-              </a:cxn>
-              <a:cxn ang="0">
-                <a:pos x="connsiteX13" y="connsiteY13"/>
-              </a:cxn>
-              <a:cxn ang="0">
-                <a:pos x="connsiteX14" y="connsiteY14"/>
-              </a:cxn>
-              <a:cxn ang="0">
-                <a:pos x="connsiteX15" y="connsiteY15"/>
-              </a:cxn>
-            </a:cxnLst>
-            <a:rect l="l" t="t" r="r" b="b"/>
-            <a:pathLst>
-              <a:path w="9413646" h="3636320">
-                <a:moveTo>
-                  <a:pt x="6366938" y="0"/>
-                </a:moveTo>
-                <a:lnTo>
-                  <a:pt x="6954168" y="0"/>
-                </a:lnTo>
-                <a:lnTo>
-                  <a:pt x="6954168" y="1687977"/>
-                </a:lnTo>
-                <a:lnTo>
-                  <a:pt x="9413646" y="1687977"/>
-                </a:lnTo>
-                <a:lnTo>
-                  <a:pt x="9413646" y="3214513"/>
-                </a:lnTo>
-                <a:lnTo>
-                  <a:pt x="7465996" y="3214513"/>
-                </a:lnTo>
-                <a:lnTo>
-                  <a:pt x="7465996" y="3636320"/>
-                </a:lnTo>
-                <a:lnTo>
-                  <a:pt x="1803380" y="3636320"/>
-                </a:lnTo>
-                <a:lnTo>
-                  <a:pt x="1803380" y="3214513"/>
-                </a:lnTo>
-                <a:lnTo>
-                  <a:pt x="0" y="3214513"/>
-                </a:lnTo>
-                <a:lnTo>
-                  <a:pt x="0" y="1687977"/>
-                </a:lnTo>
-                <a:lnTo>
-                  <a:pt x="662425" y="1687977"/>
-                </a:lnTo>
-                <a:lnTo>
-                  <a:pt x="662425" y="1071540"/>
-                </a:lnTo>
-                <a:lnTo>
-                  <a:pt x="1190931" y="1071540"/>
-                </a:lnTo>
-                <a:lnTo>
-                  <a:pt x="1190931" y="1687977"/>
-                </a:lnTo>
-                <a:lnTo>
-                  <a:pt x="6366938" y="1687977"/>
-                </a:lnTo>
-                <a:close/>
-              </a:path>
-            </a:pathLst>
-          </a:custGeom>
-          <a:ln>
-            <a:solidFill>
-              <a:schemeClr val="tx1"/>
-            </a:solidFill>
-          </a:ln>
-        </p:spPr>
-        <p:style>
-          <a:lnRef idx="2">
-            <a:schemeClr val="accent1">
-              <a:shade val="50000"/>
-            </a:schemeClr>
-          </a:lnRef>
-          <a:fillRef idx="1">
-            <a:schemeClr val="accent1"/>
-          </a:fillRef>
-          <a:effectRef idx="0">
-            <a:schemeClr val="accent1"/>
-          </a:effectRef>
-          <a:fontRef idx="minor">
-            <a:schemeClr val="lt1"/>
-          </a:fontRef>
-        </p:style>
-        <p:txBody>
-          <a:bodyPr wrap="square" rtlCol="0" anchor="ctr">
-            <a:noAutofit/>
-          </a:bodyPr>
-          <a:lstStyle/>
-          <a:p>
-            <a:pPr algn="ctr"/>
-            <a:endParaRPr lang="en-GB"/>
-          </a:p>
-        </p:txBody>
-      </p:sp>
-      <p:sp>
-        <p:nvSpPr>
           <p:cNvPr id="2" name="Title 1">
             <a:extLst>
               <a:ext uri="{FF2B5EF4-FFF2-40B4-BE49-F238E27FC236}">
-                <a16:creationId xmlns:a16="http://schemas.microsoft.com/office/drawing/2014/main" id="{8EB754C5-6E1E-4146-BC3B-9E025A5809FE}"/>
+                <a16:creationId xmlns:a16="http://schemas.microsoft.com/office/drawing/2014/main" id="{D088F6D5-0A11-4D09-A82C-1CAC5A01E398}"/>
               </a:ext>
             </a:extLst>
           </p:cNvPr>
@@ -10163,868 +9974,97 @@
           <a:lstStyle/>
           <a:p>
             <a:r>
-              <a:rPr lang="en-GB" dirty="0">
-                <a:latin typeface="Times New Roman" panose="02020603050405020304" pitchFamily="18" charset="0"/>
-                <a:cs typeface="Times New Roman" panose="02020603050405020304" pitchFamily="18" charset="0"/>
-              </a:rPr>
-              <a:t>Zone 4: Street</a:t>
-            </a:r>
-          </a:p>
-        </p:txBody>
-      </p:sp>
-      <p:sp>
-        <p:nvSpPr>
-          <p:cNvPr id="9" name="Oval 8">
-            <a:extLst>
-              <a:ext uri="{FF2B5EF4-FFF2-40B4-BE49-F238E27FC236}">
-                <a16:creationId xmlns:a16="http://schemas.microsoft.com/office/drawing/2014/main" id="{480533C7-3C8C-4F7D-9D96-B39AFE7C5FC2}"/>
-              </a:ext>
-            </a:extLst>
-          </p:cNvPr>
-          <p:cNvSpPr/>
-          <p:nvPr/>
-        </p:nvSpPr>
-        <p:spPr>
-          <a:xfrm>
-            <a:off x="9383591" y="4330743"/>
-            <a:ext cx="267990" cy="267990"/>
-          </a:xfrm>
-          <a:prstGeom prst="ellipse">
-            <a:avLst/>
-          </a:prstGeom>
-          <a:solidFill>
-            <a:srgbClr val="C00000"/>
-          </a:solidFill>
-          <a:ln>
-            <a:solidFill>
-              <a:schemeClr val="tx1"/>
-            </a:solidFill>
-          </a:ln>
-        </p:spPr>
-        <p:style>
-          <a:lnRef idx="2">
-            <a:schemeClr val="accent1">
-              <a:shade val="50000"/>
-            </a:schemeClr>
-          </a:lnRef>
-          <a:fillRef idx="1">
-            <a:schemeClr val="accent1"/>
-          </a:fillRef>
-          <a:effectRef idx="0">
-            <a:schemeClr val="accent1"/>
-          </a:effectRef>
-          <a:fontRef idx="minor">
-            <a:schemeClr val="lt1"/>
-          </a:fontRef>
-        </p:style>
-        <p:txBody>
-          <a:bodyPr rtlCol="0" anchor="ctr"/>
-          <a:lstStyle/>
-          <a:p>
-            <a:pPr algn="ctr"/>
-            <a:r>
               <a:rPr lang="en-GB" dirty="0"/>
-              <a:t>E</a:t>
-            </a:r>
-          </a:p>
-        </p:txBody>
-      </p:sp>
-      <p:sp>
-        <p:nvSpPr>
-          <p:cNvPr id="11" name="Hexagon 10">
-            <a:extLst>
-              <a:ext uri="{FF2B5EF4-FFF2-40B4-BE49-F238E27FC236}">
-                <a16:creationId xmlns:a16="http://schemas.microsoft.com/office/drawing/2014/main" id="{9B6CFC65-1E7E-4F0C-9A61-187F5C4D252B}"/>
-              </a:ext>
-            </a:extLst>
-          </p:cNvPr>
-          <p:cNvSpPr/>
-          <p:nvPr/>
-        </p:nvSpPr>
-        <p:spPr>
-          <a:xfrm>
-            <a:off x="10433198" y="4289403"/>
-            <a:ext cx="359138" cy="309330"/>
-          </a:xfrm>
-          <a:prstGeom prst="hexagon">
-            <a:avLst/>
-          </a:prstGeom>
-          <a:solidFill>
-            <a:srgbClr val="00B050"/>
-          </a:solidFill>
-          <a:ln>
-            <a:solidFill>
-              <a:schemeClr val="tx1"/>
-            </a:solidFill>
-          </a:ln>
-        </p:spPr>
-        <p:style>
-          <a:lnRef idx="2">
-            <a:schemeClr val="accent1">
-              <a:shade val="50000"/>
-            </a:schemeClr>
-          </a:lnRef>
-          <a:fillRef idx="1">
-            <a:schemeClr val="accent1"/>
-          </a:fillRef>
-          <a:effectRef idx="0">
-            <a:schemeClr val="accent1"/>
-          </a:effectRef>
-          <a:fontRef idx="minor">
-            <a:schemeClr val="lt1"/>
-          </a:fontRef>
-        </p:style>
-        <p:txBody>
-          <a:bodyPr rtlCol="0" anchor="ctr"/>
-          <a:lstStyle/>
-          <a:p>
-            <a:pPr algn="ctr"/>
-            <a:r>
-              <a:rPr lang="en-GB" dirty="0"/>
-              <a:t>H</a:t>
-            </a:r>
-          </a:p>
-        </p:txBody>
-      </p:sp>
-      <p:sp>
-        <p:nvSpPr>
-          <p:cNvPr id="14" name="TextBox 13">
-            <a:extLst>
-              <a:ext uri="{FF2B5EF4-FFF2-40B4-BE49-F238E27FC236}">
-                <a16:creationId xmlns:a16="http://schemas.microsoft.com/office/drawing/2014/main" id="{452FBF5A-B7C4-4CC6-90C7-85FA95F32CC4}"/>
-              </a:ext>
-            </a:extLst>
-          </p:cNvPr>
-          <p:cNvSpPr txBox="1"/>
-          <p:nvPr/>
-        </p:nvSpPr>
-        <p:spPr>
-          <a:xfrm>
-            <a:off x="8687420" y="2583173"/>
-            <a:ext cx="946093" cy="307777"/>
+              <a:t>Map 1</a:t>
+            </a:r>
+          </a:p>
+        </p:txBody>
+      </p:sp>
+      <p:sp>
+        <p:nvSpPr>
+          <p:cNvPr id="3" name="Content Placeholder 2">
+            <a:extLst>
+              <a:ext uri="{FF2B5EF4-FFF2-40B4-BE49-F238E27FC236}">
+                <a16:creationId xmlns:a16="http://schemas.microsoft.com/office/drawing/2014/main" id="{229F3DE9-2ED7-4551-B1B5-269018346ABD}"/>
+              </a:ext>
+            </a:extLst>
+          </p:cNvPr>
+          <p:cNvSpPr>
+            <a:spLocks noGrp="1"/>
+          </p:cNvSpPr>
+          <p:nvPr>
+            <p:ph idx="1"/>
+          </p:nvPr>
+        </p:nvSpPr>
+        <p:spPr/>
+        <p:txBody>
+          <a:bodyPr/>
+          <a:lstStyle/>
+          <a:p>
+            <a:endParaRPr lang="en-GB" dirty="0"/>
+          </a:p>
+        </p:txBody>
+      </p:sp>
+      <p:pic>
+        <p:nvPicPr>
+          <p:cNvPr id="4" name="Picture 3">
+            <a:extLst>
+              <a:ext uri="{FF2B5EF4-FFF2-40B4-BE49-F238E27FC236}">
+                <a16:creationId xmlns:a16="http://schemas.microsoft.com/office/drawing/2014/main" id="{5D90D592-94F4-4848-8579-E5AE759C4239}"/>
+              </a:ext>
+            </a:extLst>
+          </p:cNvPr>
+          <p:cNvPicPr>
+            <a:picLocks noChangeAspect="1"/>
+          </p:cNvPicPr>
+          <p:nvPr/>
+        </p:nvPicPr>
+        <p:blipFill>
+          <a:blip r:embed="rId2"/>
+          <a:stretch>
+            <a:fillRect/>
+          </a:stretch>
+        </p:blipFill>
+        <p:spPr>
+          <a:xfrm>
+            <a:off x="6383433" y="2150389"/>
+            <a:ext cx="2688648" cy="3934605"/>
           </a:xfrm>
           <a:prstGeom prst="rect">
             <a:avLst/>
           </a:prstGeom>
-          <a:noFill/>
-        </p:spPr>
-        <p:txBody>
-          <a:bodyPr wrap="none" rtlCol="0">
-            <a:spAutoFit/>
-          </a:bodyPr>
-          <a:lstStyle/>
-          <a:p>
-            <a:r>
-              <a:rPr lang="en-GB" sz="1400" dirty="0">
-                <a:latin typeface="Times New Roman" panose="02020603050405020304" pitchFamily="18" charset="0"/>
-                <a:cs typeface="Times New Roman" panose="02020603050405020304" pitchFamily="18" charset="0"/>
-              </a:rPr>
-              <a:t>From Park</a:t>
-            </a:r>
-          </a:p>
-        </p:txBody>
-      </p:sp>
-      <p:sp>
-        <p:nvSpPr>
-          <p:cNvPr id="22" name="Oval 21">
-            <a:extLst>
-              <a:ext uri="{FF2B5EF4-FFF2-40B4-BE49-F238E27FC236}">
-                <a16:creationId xmlns:a16="http://schemas.microsoft.com/office/drawing/2014/main" id="{B76FCBB2-D65F-4399-A7FF-5DD115296C9E}"/>
-              </a:ext>
-            </a:extLst>
-          </p:cNvPr>
-          <p:cNvSpPr/>
-          <p:nvPr/>
-        </p:nvSpPr>
-        <p:spPr>
-          <a:xfrm>
-            <a:off x="5974816" y="5279393"/>
-            <a:ext cx="267990" cy="267990"/>
-          </a:xfrm>
-          <a:prstGeom prst="ellipse">
-            <a:avLst/>
-          </a:prstGeom>
-          <a:solidFill>
-            <a:srgbClr val="C00000"/>
-          </a:solidFill>
-          <a:ln>
-            <a:solidFill>
-              <a:schemeClr val="tx1"/>
-            </a:solidFill>
-          </a:ln>
-        </p:spPr>
-        <p:style>
-          <a:lnRef idx="2">
-            <a:schemeClr val="accent1">
-              <a:shade val="50000"/>
-            </a:schemeClr>
-          </a:lnRef>
-          <a:fillRef idx="1">
-            <a:schemeClr val="accent1"/>
-          </a:fillRef>
-          <a:effectRef idx="0">
-            <a:schemeClr val="accent1"/>
-          </a:effectRef>
-          <a:fontRef idx="minor">
-            <a:schemeClr val="lt1"/>
-          </a:fontRef>
-        </p:style>
-        <p:txBody>
-          <a:bodyPr rtlCol="0" anchor="ctr"/>
-          <a:lstStyle/>
-          <a:p>
-            <a:pPr algn="ctr"/>
-            <a:r>
-              <a:rPr lang="en-GB" dirty="0"/>
-              <a:t>E</a:t>
-            </a:r>
-          </a:p>
-        </p:txBody>
-      </p:sp>
-      <p:sp>
-        <p:nvSpPr>
-          <p:cNvPr id="24" name="Oval 23">
-            <a:extLst>
-              <a:ext uri="{FF2B5EF4-FFF2-40B4-BE49-F238E27FC236}">
-                <a16:creationId xmlns:a16="http://schemas.microsoft.com/office/drawing/2014/main" id="{FF3E68A0-2929-4109-9D87-649FB8655A0E}"/>
-              </a:ext>
-            </a:extLst>
-          </p:cNvPr>
-          <p:cNvSpPr/>
-          <p:nvPr/>
-        </p:nvSpPr>
-        <p:spPr>
-          <a:xfrm>
-            <a:off x="2346345" y="4337035"/>
-            <a:ext cx="267990" cy="267990"/>
-          </a:xfrm>
-          <a:prstGeom prst="ellipse">
-            <a:avLst/>
-          </a:prstGeom>
-          <a:solidFill>
-            <a:srgbClr val="C00000"/>
-          </a:solidFill>
-          <a:ln>
-            <a:solidFill>
-              <a:schemeClr val="tx1"/>
-            </a:solidFill>
-          </a:ln>
-        </p:spPr>
-        <p:style>
-          <a:lnRef idx="2">
-            <a:schemeClr val="accent1">
-              <a:shade val="50000"/>
-            </a:schemeClr>
-          </a:lnRef>
-          <a:fillRef idx="1">
-            <a:schemeClr val="accent1"/>
-          </a:fillRef>
-          <a:effectRef idx="0">
-            <a:schemeClr val="accent1"/>
-          </a:effectRef>
-          <a:fontRef idx="minor">
-            <a:schemeClr val="lt1"/>
-          </a:fontRef>
-        </p:style>
-        <p:txBody>
-          <a:bodyPr rtlCol="0" anchor="ctr"/>
-          <a:lstStyle/>
-          <a:p>
-            <a:pPr algn="ctr"/>
-            <a:r>
-              <a:rPr lang="en-GB" dirty="0"/>
-              <a:t>E</a:t>
-            </a:r>
-          </a:p>
-        </p:txBody>
-      </p:sp>
-      <p:sp>
-        <p:nvSpPr>
-          <p:cNvPr id="35" name="Rectangle 34">
-            <a:extLst>
-              <a:ext uri="{FF2B5EF4-FFF2-40B4-BE49-F238E27FC236}">
-                <a16:creationId xmlns:a16="http://schemas.microsoft.com/office/drawing/2014/main" id="{C6C6D5F0-4EBA-4C75-B930-CBE8B833183C}"/>
-              </a:ext>
-            </a:extLst>
-          </p:cNvPr>
-          <p:cNvSpPr/>
-          <p:nvPr/>
-        </p:nvSpPr>
-        <p:spPr>
-          <a:xfrm>
-            <a:off x="2186725" y="3473043"/>
-            <a:ext cx="545284" cy="266350"/>
-          </a:xfrm>
-          <a:prstGeom prst="rect">
-            <a:avLst/>
-          </a:prstGeom>
-          <a:solidFill>
-            <a:srgbClr val="FFFF00"/>
-          </a:solidFill>
-          <a:ln>
-            <a:solidFill>
-              <a:schemeClr val="tx1"/>
-            </a:solidFill>
-          </a:ln>
-        </p:spPr>
-        <p:style>
-          <a:lnRef idx="2">
-            <a:schemeClr val="accent1">
-              <a:shade val="50000"/>
-            </a:schemeClr>
-          </a:lnRef>
-          <a:fillRef idx="1">
-            <a:schemeClr val="accent1"/>
-          </a:fillRef>
-          <a:effectRef idx="0">
-            <a:schemeClr val="accent1"/>
-          </a:effectRef>
-          <a:fontRef idx="minor">
-            <a:schemeClr val="lt1"/>
-          </a:fontRef>
-        </p:style>
-        <p:txBody>
-          <a:bodyPr rtlCol="0" anchor="ctr"/>
-          <a:lstStyle/>
-          <a:p>
-            <a:pPr algn="ctr"/>
-            <a:r>
-              <a:rPr lang="en-GB" dirty="0">
-                <a:solidFill>
-                  <a:schemeClr val="tx1"/>
-                </a:solidFill>
-              </a:rPr>
-              <a:t>E</a:t>
-            </a:r>
-          </a:p>
-        </p:txBody>
-      </p:sp>
-      <p:sp>
-        <p:nvSpPr>
-          <p:cNvPr id="36" name="Rectangle 35">
-            <a:extLst>
-              <a:ext uri="{FF2B5EF4-FFF2-40B4-BE49-F238E27FC236}">
-                <a16:creationId xmlns:a16="http://schemas.microsoft.com/office/drawing/2014/main" id="{2E7E7B48-6113-4ABF-8CBC-1DC546371735}"/>
-              </a:ext>
-            </a:extLst>
-          </p:cNvPr>
-          <p:cNvSpPr/>
-          <p:nvPr/>
-        </p:nvSpPr>
-        <p:spPr>
-          <a:xfrm>
-            <a:off x="3705137" y="4099588"/>
-            <a:ext cx="4781725" cy="1031846"/>
-          </a:xfrm>
-          <a:prstGeom prst="rect">
-            <a:avLst/>
-          </a:prstGeom>
-          <a:solidFill>
-            <a:schemeClr val="bg1"/>
-          </a:solidFill>
-          <a:ln>
-            <a:solidFill>
-              <a:schemeClr val="tx1"/>
-            </a:solidFill>
-          </a:ln>
-        </p:spPr>
-        <p:style>
-          <a:lnRef idx="2">
-            <a:schemeClr val="accent1">
-              <a:shade val="50000"/>
-            </a:schemeClr>
-          </a:lnRef>
-          <a:fillRef idx="1">
-            <a:schemeClr val="accent1"/>
-          </a:fillRef>
-          <a:effectRef idx="0">
-            <a:schemeClr val="accent1"/>
-          </a:effectRef>
-          <a:fontRef idx="minor">
-            <a:schemeClr val="lt1"/>
-          </a:fontRef>
-        </p:style>
-        <p:txBody>
-          <a:bodyPr rtlCol="0" anchor="ctr"/>
-          <a:lstStyle/>
-          <a:p>
-            <a:pPr algn="ctr"/>
-            <a:endParaRPr lang="en-GB"/>
-          </a:p>
-        </p:txBody>
-      </p:sp>
-      <p:sp>
-        <p:nvSpPr>
-          <p:cNvPr id="38" name="Freeform: Shape 37">
-            <a:extLst>
-              <a:ext uri="{FF2B5EF4-FFF2-40B4-BE49-F238E27FC236}">
-                <a16:creationId xmlns:a16="http://schemas.microsoft.com/office/drawing/2014/main" id="{074CF8F4-6D96-4EEB-9B3D-B9AF2EF05BF9}"/>
-              </a:ext>
-            </a:extLst>
-          </p:cNvPr>
-          <p:cNvSpPr/>
-          <p:nvPr/>
-        </p:nvSpPr>
-        <p:spPr>
-          <a:xfrm>
-            <a:off x="906004" y="1565084"/>
-            <a:ext cx="2799133" cy="571745"/>
-          </a:xfrm>
-          <a:custGeom>
-            <a:avLst/>
-            <a:gdLst>
-              <a:gd name="connsiteX0" fmla="*/ 0 w 4379054"/>
-              <a:gd name="connsiteY0" fmla="*/ 0 h 813732"/>
-              <a:gd name="connsiteX1" fmla="*/ 4379054 w 4379054"/>
-              <a:gd name="connsiteY1" fmla="*/ 0 h 813732"/>
-              <a:gd name="connsiteX2" fmla="*/ 4379054 w 4379054"/>
-              <a:gd name="connsiteY2" fmla="*/ 637563 h 813732"/>
-              <a:gd name="connsiteX3" fmla="*/ 3473043 w 4379054"/>
-              <a:gd name="connsiteY3" fmla="*/ 637563 h 813732"/>
-              <a:gd name="connsiteX4" fmla="*/ 3473043 w 4379054"/>
-              <a:gd name="connsiteY4" fmla="*/ 813732 h 813732"/>
-              <a:gd name="connsiteX5" fmla="*/ 838899 w 4379054"/>
-              <a:gd name="connsiteY5" fmla="*/ 813732 h 813732"/>
-              <a:gd name="connsiteX6" fmla="*/ 838899 w 4379054"/>
-              <a:gd name="connsiteY6" fmla="*/ 637563 h 813732"/>
-              <a:gd name="connsiteX7" fmla="*/ 0 w 4379054"/>
-              <a:gd name="connsiteY7" fmla="*/ 637563 h 813732"/>
-            </a:gdLst>
-            <a:ahLst/>
-            <a:cxnLst>
-              <a:cxn ang="0">
-                <a:pos x="connsiteX0" y="connsiteY0"/>
-              </a:cxn>
-              <a:cxn ang="0">
-                <a:pos x="connsiteX1" y="connsiteY1"/>
-              </a:cxn>
-              <a:cxn ang="0">
-                <a:pos x="connsiteX2" y="connsiteY2"/>
-              </a:cxn>
-              <a:cxn ang="0">
-                <a:pos x="connsiteX3" y="connsiteY3"/>
-              </a:cxn>
-              <a:cxn ang="0">
-                <a:pos x="connsiteX4" y="connsiteY4"/>
-              </a:cxn>
-              <a:cxn ang="0">
-                <a:pos x="connsiteX5" y="connsiteY5"/>
-              </a:cxn>
-              <a:cxn ang="0">
-                <a:pos x="connsiteX6" y="connsiteY6"/>
-              </a:cxn>
-              <a:cxn ang="0">
-                <a:pos x="connsiteX7" y="connsiteY7"/>
-              </a:cxn>
-            </a:cxnLst>
-            <a:rect l="l" t="t" r="r" b="b"/>
-            <a:pathLst>
-              <a:path w="4379054" h="813732">
-                <a:moveTo>
-                  <a:pt x="0" y="0"/>
-                </a:moveTo>
-                <a:lnTo>
-                  <a:pt x="4379054" y="0"/>
-                </a:lnTo>
-                <a:lnTo>
-                  <a:pt x="4379054" y="637563"/>
-                </a:lnTo>
-                <a:lnTo>
-                  <a:pt x="3473043" y="637563"/>
-                </a:lnTo>
-                <a:lnTo>
-                  <a:pt x="3473043" y="813732"/>
-                </a:lnTo>
-                <a:lnTo>
-                  <a:pt x="838899" y="813732"/>
-                </a:lnTo>
-                <a:lnTo>
-                  <a:pt x="838899" y="637563"/>
-                </a:lnTo>
-                <a:lnTo>
-                  <a:pt x="0" y="637563"/>
-                </a:lnTo>
-                <a:close/>
-              </a:path>
-            </a:pathLst>
-          </a:custGeom>
-        </p:spPr>
-        <p:style>
-          <a:lnRef idx="2">
-            <a:schemeClr val="accent1">
-              <a:shade val="50000"/>
-            </a:schemeClr>
-          </a:lnRef>
-          <a:fillRef idx="1">
-            <a:schemeClr val="accent1"/>
-          </a:fillRef>
-          <a:effectRef idx="0">
-            <a:schemeClr val="accent1"/>
-          </a:effectRef>
-          <a:fontRef idx="minor">
-            <a:schemeClr val="lt1"/>
-          </a:fontRef>
-        </p:style>
-        <p:txBody>
-          <a:bodyPr wrap="square" rtlCol="0" anchor="ctr">
-            <a:noAutofit/>
-          </a:bodyPr>
-          <a:lstStyle/>
-          <a:p>
-            <a:pPr algn="ctr"/>
-            <a:endParaRPr lang="en-GB"/>
-          </a:p>
-        </p:txBody>
-      </p:sp>
-      <p:sp>
-        <p:nvSpPr>
-          <p:cNvPr id="40" name="Oval 39">
-            <a:extLst>
-              <a:ext uri="{FF2B5EF4-FFF2-40B4-BE49-F238E27FC236}">
-                <a16:creationId xmlns:a16="http://schemas.microsoft.com/office/drawing/2014/main" id="{C859ABE2-3EBE-4DD1-9040-B2F7A1E7DDA6}"/>
-              </a:ext>
-            </a:extLst>
-          </p:cNvPr>
-          <p:cNvSpPr/>
-          <p:nvPr/>
-        </p:nvSpPr>
-        <p:spPr>
-          <a:xfrm>
-            <a:off x="2280631" y="3095296"/>
-            <a:ext cx="333704" cy="333704"/>
-          </a:xfrm>
-          <a:prstGeom prst="ellipse">
-            <a:avLst/>
-          </a:prstGeom>
-          <a:solidFill>
-            <a:srgbClr val="00B050"/>
-          </a:solidFill>
-          <a:ln>
-            <a:solidFill>
-              <a:schemeClr val="tx1"/>
-            </a:solidFill>
-          </a:ln>
-        </p:spPr>
-        <p:style>
-          <a:lnRef idx="2">
-            <a:schemeClr val="accent1">
-              <a:shade val="50000"/>
-            </a:schemeClr>
-          </a:lnRef>
-          <a:fillRef idx="1">
-            <a:schemeClr val="accent1"/>
-          </a:fillRef>
-          <a:effectRef idx="0">
-            <a:schemeClr val="accent1"/>
-          </a:effectRef>
-          <a:fontRef idx="minor">
-            <a:schemeClr val="lt1"/>
-          </a:fontRef>
-        </p:style>
-        <p:txBody>
-          <a:bodyPr rtlCol="0" anchor="ctr"/>
-          <a:lstStyle/>
-          <a:p>
-            <a:pPr algn="ctr"/>
-            <a:r>
-              <a:rPr lang="en-GB" dirty="0"/>
-              <a:t>4</a:t>
-            </a:r>
-          </a:p>
-        </p:txBody>
-      </p:sp>
-      <p:sp>
-        <p:nvSpPr>
-          <p:cNvPr id="42" name="Oval 41">
-            <a:extLst>
-              <a:ext uri="{FF2B5EF4-FFF2-40B4-BE49-F238E27FC236}">
-                <a16:creationId xmlns:a16="http://schemas.microsoft.com/office/drawing/2014/main" id="{879DE434-281E-4322-8CDF-B2C9D4C502E9}"/>
-              </a:ext>
-            </a:extLst>
-          </p:cNvPr>
-          <p:cNvSpPr/>
-          <p:nvPr/>
-        </p:nvSpPr>
-        <p:spPr>
-          <a:xfrm>
-            <a:off x="8025143" y="2088858"/>
-            <a:ext cx="333704" cy="333704"/>
-          </a:xfrm>
-          <a:prstGeom prst="ellipse">
-            <a:avLst/>
-          </a:prstGeom>
-          <a:solidFill>
-            <a:srgbClr val="00B050"/>
-          </a:solidFill>
-          <a:ln>
-            <a:solidFill>
-              <a:schemeClr val="tx1"/>
-            </a:solidFill>
-          </a:ln>
-        </p:spPr>
-        <p:style>
-          <a:lnRef idx="2">
-            <a:schemeClr val="accent1">
-              <a:shade val="50000"/>
-            </a:schemeClr>
-          </a:lnRef>
-          <a:fillRef idx="1">
-            <a:schemeClr val="accent1"/>
-          </a:fillRef>
-          <a:effectRef idx="0">
-            <a:schemeClr val="accent1"/>
-          </a:effectRef>
-          <a:fontRef idx="minor">
-            <a:schemeClr val="lt1"/>
-          </a:fontRef>
-        </p:style>
-        <p:txBody>
-          <a:bodyPr rtlCol="0" anchor="ctr"/>
-          <a:lstStyle/>
-          <a:p>
-            <a:pPr algn="ctr"/>
-            <a:r>
-              <a:rPr lang="en-GB" dirty="0"/>
-              <a:t>4</a:t>
-            </a:r>
-          </a:p>
-        </p:txBody>
-      </p:sp>
-      <p:sp>
-        <p:nvSpPr>
-          <p:cNvPr id="46" name="Isosceles Triangle 45">
-            <a:extLst>
-              <a:ext uri="{FF2B5EF4-FFF2-40B4-BE49-F238E27FC236}">
-                <a16:creationId xmlns:a16="http://schemas.microsoft.com/office/drawing/2014/main" id="{99BA1B8B-5369-40BE-B8AC-BDCA1D44F801}"/>
-              </a:ext>
-            </a:extLst>
-          </p:cNvPr>
-          <p:cNvSpPr/>
-          <p:nvPr/>
-        </p:nvSpPr>
-        <p:spPr>
-          <a:xfrm>
-            <a:off x="5925866" y="3739393"/>
-            <a:ext cx="293399" cy="260059"/>
-          </a:xfrm>
-          <a:prstGeom prst="triangle">
-            <a:avLst/>
-          </a:prstGeom>
-          <a:solidFill>
-            <a:srgbClr val="FFFF00"/>
-          </a:solidFill>
-          <a:ln>
-            <a:solidFill>
-              <a:schemeClr val="tx1"/>
-            </a:solidFill>
-          </a:ln>
-        </p:spPr>
-        <p:style>
-          <a:lnRef idx="2">
-            <a:schemeClr val="accent1">
-              <a:shade val="50000"/>
-            </a:schemeClr>
-          </a:lnRef>
-          <a:fillRef idx="1">
-            <a:schemeClr val="accent1"/>
-          </a:fillRef>
-          <a:effectRef idx="0">
-            <a:schemeClr val="accent1"/>
-          </a:effectRef>
-          <a:fontRef idx="minor">
-            <a:schemeClr val="lt1"/>
-          </a:fontRef>
-        </p:style>
-        <p:txBody>
-          <a:bodyPr rtlCol="0" anchor="ctr"/>
-          <a:lstStyle/>
-          <a:p>
-            <a:pPr algn="ctr"/>
-            <a:r>
-              <a:rPr lang="en-GB" sz="1200" dirty="0">
-                <a:solidFill>
-                  <a:schemeClr val="tx1"/>
-                </a:solidFill>
-              </a:rPr>
-              <a:t>E</a:t>
-            </a:r>
-            <a:endParaRPr lang="en-GB" dirty="0">
-              <a:solidFill>
-                <a:schemeClr val="tx1"/>
-              </a:solidFill>
-            </a:endParaRPr>
-          </a:p>
-        </p:txBody>
-      </p:sp>
-      <p:sp>
-        <p:nvSpPr>
-          <p:cNvPr id="48" name="Isosceles Triangle 47">
-            <a:extLst>
-              <a:ext uri="{FF2B5EF4-FFF2-40B4-BE49-F238E27FC236}">
-                <a16:creationId xmlns:a16="http://schemas.microsoft.com/office/drawing/2014/main" id="{C60559A8-4A3B-498A-96C4-4F2D9EFB6EEF}"/>
-              </a:ext>
-            </a:extLst>
-          </p:cNvPr>
-          <p:cNvSpPr/>
-          <p:nvPr/>
-        </p:nvSpPr>
-        <p:spPr>
-          <a:xfrm>
-            <a:off x="7673971" y="5242701"/>
-            <a:ext cx="293399" cy="260059"/>
-          </a:xfrm>
-          <a:prstGeom prst="triangle">
-            <a:avLst/>
-          </a:prstGeom>
-          <a:solidFill>
-            <a:srgbClr val="FFFF00"/>
-          </a:solidFill>
-          <a:ln>
-            <a:solidFill>
-              <a:schemeClr val="tx1"/>
-            </a:solidFill>
-          </a:ln>
-        </p:spPr>
-        <p:style>
-          <a:lnRef idx="2">
-            <a:schemeClr val="accent1">
-              <a:shade val="50000"/>
-            </a:schemeClr>
-          </a:lnRef>
-          <a:fillRef idx="1">
-            <a:schemeClr val="accent1"/>
-          </a:fillRef>
-          <a:effectRef idx="0">
-            <a:schemeClr val="accent1"/>
-          </a:effectRef>
-          <a:fontRef idx="minor">
-            <a:schemeClr val="lt1"/>
-          </a:fontRef>
-        </p:style>
-        <p:txBody>
-          <a:bodyPr rtlCol="0" anchor="ctr"/>
-          <a:lstStyle/>
-          <a:p>
-            <a:pPr algn="ctr"/>
-            <a:r>
-              <a:rPr lang="en-GB" sz="1200" dirty="0">
-                <a:solidFill>
-                  <a:schemeClr val="tx1"/>
-                </a:solidFill>
-              </a:rPr>
-              <a:t>E</a:t>
-            </a:r>
-            <a:endParaRPr lang="en-GB" dirty="0">
-              <a:solidFill>
-                <a:schemeClr val="tx1"/>
-              </a:solidFill>
-            </a:endParaRPr>
-          </a:p>
-        </p:txBody>
-      </p:sp>
-      <p:sp>
-        <p:nvSpPr>
-          <p:cNvPr id="50" name="Isosceles Triangle 49">
-            <a:extLst>
-              <a:ext uri="{FF2B5EF4-FFF2-40B4-BE49-F238E27FC236}">
-                <a16:creationId xmlns:a16="http://schemas.microsoft.com/office/drawing/2014/main" id="{295B24AF-1D8D-4C1F-AC3E-66DAE5341BBC}"/>
-              </a:ext>
-            </a:extLst>
-          </p:cNvPr>
-          <p:cNvSpPr/>
-          <p:nvPr/>
-        </p:nvSpPr>
-        <p:spPr>
-          <a:xfrm>
-            <a:off x="4398314" y="5242702"/>
-            <a:ext cx="293399" cy="260059"/>
-          </a:xfrm>
-          <a:prstGeom prst="triangle">
-            <a:avLst/>
-          </a:prstGeom>
-          <a:solidFill>
-            <a:srgbClr val="FFFF00"/>
-          </a:solidFill>
-          <a:ln>
-            <a:solidFill>
-              <a:schemeClr val="tx1"/>
-            </a:solidFill>
-          </a:ln>
-        </p:spPr>
-        <p:style>
-          <a:lnRef idx="2">
-            <a:schemeClr val="accent1">
-              <a:shade val="50000"/>
-            </a:schemeClr>
-          </a:lnRef>
-          <a:fillRef idx="1">
-            <a:schemeClr val="accent1"/>
-          </a:fillRef>
-          <a:effectRef idx="0">
-            <a:schemeClr val="accent1"/>
-          </a:effectRef>
-          <a:fontRef idx="minor">
-            <a:schemeClr val="lt1"/>
-          </a:fontRef>
-        </p:style>
-        <p:txBody>
-          <a:bodyPr rtlCol="0" anchor="ctr"/>
-          <a:lstStyle/>
-          <a:p>
-            <a:pPr algn="ctr"/>
-            <a:r>
-              <a:rPr lang="en-GB" sz="1200" dirty="0">
-                <a:solidFill>
-                  <a:schemeClr val="tx1"/>
-                </a:solidFill>
-              </a:rPr>
-              <a:t>E</a:t>
-            </a:r>
-            <a:endParaRPr lang="en-GB" dirty="0">
-              <a:solidFill>
-                <a:schemeClr val="tx1"/>
-              </a:solidFill>
-            </a:endParaRPr>
-          </a:p>
-        </p:txBody>
-      </p:sp>
+        </p:spPr>
+      </p:pic>
       <p:cxnSp>
         <p:nvCxnSpPr>
-          <p:cNvPr id="51" name="Straight Connector 50">
-            <a:extLst>
-              <a:ext uri="{FF2B5EF4-FFF2-40B4-BE49-F238E27FC236}">
-                <a16:creationId xmlns:a16="http://schemas.microsoft.com/office/drawing/2014/main" id="{79D0A7C9-33DB-467A-AE17-101FBAA91E33}"/>
-              </a:ext>
-            </a:extLst>
-          </p:cNvPr>
-          <p:cNvCxnSpPr>
-            <a:cxnSpLocks/>
-          </p:cNvCxnSpPr>
+          <p:cNvPr id="6" name="Straight Connector 5">
+            <a:extLst>
+              <a:ext uri="{FF2B5EF4-FFF2-40B4-BE49-F238E27FC236}">
+                <a16:creationId xmlns:a16="http://schemas.microsoft.com/office/drawing/2014/main" id="{A1DD8DCA-DFB9-4C5D-9383-4C300B8C1D75}"/>
+              </a:ext>
+            </a:extLst>
+          </p:cNvPr>
+          <p:cNvCxnSpPr/>
           <p:nvPr/>
         </p:nvCxnSpPr>
         <p:spPr>
           <a:xfrm>
-            <a:off x="6774897" y="2242747"/>
-            <a:ext cx="1192473" cy="0"/>
+            <a:off x="6968358" y="4083269"/>
+            <a:ext cx="945931" cy="0"/>
           </a:xfrm>
           <a:prstGeom prst="line">
             <a:avLst/>
           </a:prstGeom>
-          <a:ln w="25400">
-            <a:solidFill>
-              <a:schemeClr val="tx1"/>
-            </a:solidFill>
-          </a:ln>
         </p:spPr>
         <p:style>
-          <a:lnRef idx="1">
-            <a:schemeClr val="accent1"/>
+          <a:lnRef idx="3">
+            <a:schemeClr val="dk1"/>
           </a:lnRef>
           <a:fillRef idx="0">
-            <a:schemeClr val="accent1"/>
+            <a:schemeClr val="dk1"/>
           </a:fillRef>
-          <a:effectRef idx="0">
-            <a:schemeClr val="accent1"/>
+          <a:effectRef idx="2">
+            <a:schemeClr val="dk1"/>
           </a:effectRef>
           <a:fontRef idx="minor">
             <a:schemeClr val="tx1"/>
@@ -11033,10 +10073,10 @@
       </p:cxnSp>
       <p:sp>
         <p:nvSpPr>
-          <p:cNvPr id="52" name="TextBox 51">
-            <a:extLst>
-              <a:ext uri="{FF2B5EF4-FFF2-40B4-BE49-F238E27FC236}">
-                <a16:creationId xmlns:a16="http://schemas.microsoft.com/office/drawing/2014/main" id="{1EA39CFD-E59C-4028-8E21-020BA79EEE62}"/>
+          <p:cNvPr id="7" name="TextBox 6">
+            <a:extLst>
+              <a:ext uri="{FF2B5EF4-FFF2-40B4-BE49-F238E27FC236}">
+                <a16:creationId xmlns:a16="http://schemas.microsoft.com/office/drawing/2014/main" id="{9EAC74C2-D19A-45B2-AB02-C7222D39D323}"/>
               </a:ext>
             </a:extLst>
           </p:cNvPr>
@@ -11045,8 +10085,8 @@
         </p:nvSpPr>
         <p:spPr>
           <a:xfrm>
-            <a:off x="6242806" y="2072080"/>
-            <a:ext cx="522900" cy="307777"/>
+            <a:off x="7118130" y="2932163"/>
+            <a:ext cx="906516" cy="369332"/>
           </a:xfrm>
           <a:prstGeom prst="rect">
             <a:avLst/>
@@ -11054,70 +10094,24 @@
           <a:noFill/>
         </p:spPr>
         <p:txBody>
-          <a:bodyPr wrap="none" rtlCol="0">
+          <a:bodyPr wrap="square" rtlCol="0">
             <a:spAutoFit/>
           </a:bodyPr>
           <a:lstStyle/>
           <a:p>
             <a:r>
-              <a:rPr lang="en-GB" sz="1400" dirty="0">
-                <a:latin typeface="Times New Roman" panose="02020603050405020304" pitchFamily="18" charset="0"/>
-                <a:cs typeface="Times New Roman" panose="02020603050405020304" pitchFamily="18" charset="0"/>
-              </a:rPr>
-              <a:t>Start</a:t>
-            </a:r>
-          </a:p>
-        </p:txBody>
-      </p:sp>
-      <p:cxnSp>
-        <p:nvCxnSpPr>
-          <p:cNvPr id="53" name="Straight Connector 52">
-            <a:extLst>
-              <a:ext uri="{FF2B5EF4-FFF2-40B4-BE49-F238E27FC236}">
-                <a16:creationId xmlns:a16="http://schemas.microsoft.com/office/drawing/2014/main" id="{D9CBA829-CF01-45EB-9208-E806FF7C15F0}"/>
-              </a:ext>
-            </a:extLst>
-          </p:cNvPr>
-          <p:cNvCxnSpPr>
-            <a:cxnSpLocks/>
-          </p:cNvCxnSpPr>
-          <p:nvPr/>
-        </p:nvCxnSpPr>
-        <p:spPr>
-          <a:xfrm>
-            <a:off x="2681675" y="3251904"/>
-            <a:ext cx="712033" cy="0"/>
-          </a:xfrm>
-          <a:prstGeom prst="line">
-            <a:avLst/>
-          </a:prstGeom>
-          <a:ln w="25400">
-            <a:solidFill>
-              <a:schemeClr val="tx1"/>
-            </a:solidFill>
-          </a:ln>
-        </p:spPr>
-        <p:style>
-          <a:lnRef idx="1">
-            <a:schemeClr val="accent1"/>
-          </a:lnRef>
-          <a:fillRef idx="0">
-            <a:schemeClr val="accent1"/>
-          </a:fillRef>
-          <a:effectRef idx="0">
-            <a:schemeClr val="accent1"/>
-          </a:effectRef>
-          <a:fontRef idx="minor">
-            <a:schemeClr val="tx1"/>
-          </a:fontRef>
-        </p:style>
-      </p:cxnSp>
-      <p:sp>
-        <p:nvSpPr>
-          <p:cNvPr id="54" name="TextBox 53">
-            <a:extLst>
-              <a:ext uri="{FF2B5EF4-FFF2-40B4-BE49-F238E27FC236}">
-                <a16:creationId xmlns:a16="http://schemas.microsoft.com/office/drawing/2014/main" id="{AF08E0D2-64BB-4962-9266-119E95150F34}"/>
+              <a:rPr lang="en-GB" dirty="0"/>
+              <a:t>1</a:t>
+            </a:r>
+          </a:p>
+        </p:txBody>
+      </p:sp>
+      <p:sp>
+        <p:nvSpPr>
+          <p:cNvPr id="8" name="TextBox 7">
+            <a:extLst>
+              <a:ext uri="{FF2B5EF4-FFF2-40B4-BE49-F238E27FC236}">
+                <a16:creationId xmlns:a16="http://schemas.microsoft.com/office/drawing/2014/main" id="{72D17196-CD3B-4436-B300-81FD4E10F2C2}"/>
               </a:ext>
             </a:extLst>
           </p:cNvPr>
@@ -11126,8 +10120,8 @@
         </p:nvSpPr>
         <p:spPr>
           <a:xfrm>
-            <a:off x="3393708" y="3102642"/>
-            <a:ext cx="473206" cy="307777"/>
+            <a:off x="7118130" y="4155012"/>
+            <a:ext cx="906516" cy="369332"/>
           </a:xfrm>
           <a:prstGeom prst="rect">
             <a:avLst/>
@@ -11135,17 +10129,14 @@
           <a:noFill/>
         </p:spPr>
         <p:txBody>
-          <a:bodyPr wrap="none" rtlCol="0">
+          <a:bodyPr wrap="square" rtlCol="0">
             <a:spAutoFit/>
           </a:bodyPr>
           <a:lstStyle/>
           <a:p>
             <a:r>
-              <a:rPr lang="en-GB" sz="1400" dirty="0">
-                <a:latin typeface="Times New Roman" panose="02020603050405020304" pitchFamily="18" charset="0"/>
-                <a:cs typeface="Times New Roman" panose="02020603050405020304" pitchFamily="18" charset="0"/>
-              </a:rPr>
-              <a:t>End</a:t>
+              <a:rPr lang="en-GB" dirty="0"/>
+              <a:t>2</a:t>
             </a:r>
           </a:p>
         </p:txBody>
@@ -11153,7 +10144,7 @@
     </p:spTree>
     <p:extLst>
       <p:ext uri="{BB962C8B-B14F-4D97-AF65-F5344CB8AC3E}">
-        <p14:creationId xmlns:p14="http://schemas.microsoft.com/office/powerpoint/2010/main" val="2966762191"/>
+        <p14:creationId xmlns:p14="http://schemas.microsoft.com/office/powerpoint/2010/main" val="1555372909"/>
       </p:ext>
     </p:extLst>
   </p:cSld>
@@ -11936,6 +10927,1817 @@
 </file>
 
 <file path=ppt/slides/slide20.xml><?xml version="1.0" encoding="utf-8"?>
+<p:sld xmlns:a="http://schemas.openxmlformats.org/drawingml/2006/main" xmlns:r="http://schemas.openxmlformats.org/officeDocument/2006/relationships" xmlns:p="http://schemas.openxmlformats.org/presentationml/2006/main">
+  <p:cSld>
+    <p:spTree>
+      <p:nvGrpSpPr>
+        <p:cNvPr id="1" name=""/>
+        <p:cNvGrpSpPr/>
+        <p:nvPr/>
+      </p:nvGrpSpPr>
+      <p:grpSpPr>
+        <a:xfrm>
+          <a:off x="0" y="0"/>
+          <a:ext cx="0" cy="0"/>
+          <a:chOff x="0" y="0"/>
+          <a:chExt cx="0" cy="0"/>
+        </a:xfrm>
+      </p:grpSpPr>
+      <p:sp>
+        <p:nvSpPr>
+          <p:cNvPr id="2" name="Title 1">
+            <a:extLst>
+              <a:ext uri="{FF2B5EF4-FFF2-40B4-BE49-F238E27FC236}">
+                <a16:creationId xmlns:a16="http://schemas.microsoft.com/office/drawing/2014/main" id="{45AB6DF9-8459-4D74-9301-FD16EC404A07}"/>
+              </a:ext>
+            </a:extLst>
+          </p:cNvPr>
+          <p:cNvSpPr>
+            <a:spLocks noGrp="1"/>
+          </p:cNvSpPr>
+          <p:nvPr>
+            <p:ph type="title"/>
+          </p:nvPr>
+        </p:nvSpPr>
+        <p:spPr/>
+        <p:txBody>
+          <a:bodyPr/>
+          <a:lstStyle/>
+          <a:p>
+            <a:r>
+              <a:rPr lang="en-GB" dirty="0"/>
+              <a:t>Map 2</a:t>
+            </a:r>
+          </a:p>
+        </p:txBody>
+      </p:sp>
+      <p:sp>
+        <p:nvSpPr>
+          <p:cNvPr id="3" name="Content Placeholder 2">
+            <a:extLst>
+              <a:ext uri="{FF2B5EF4-FFF2-40B4-BE49-F238E27FC236}">
+                <a16:creationId xmlns:a16="http://schemas.microsoft.com/office/drawing/2014/main" id="{05400945-85FF-48FB-A5CF-AB0465299F8C}"/>
+              </a:ext>
+            </a:extLst>
+          </p:cNvPr>
+          <p:cNvSpPr>
+            <a:spLocks noGrp="1"/>
+          </p:cNvSpPr>
+          <p:nvPr>
+            <p:ph idx="1"/>
+          </p:nvPr>
+        </p:nvSpPr>
+        <p:spPr/>
+        <p:txBody>
+          <a:bodyPr/>
+          <a:lstStyle/>
+          <a:p>
+            <a:endParaRPr lang="en-GB"/>
+          </a:p>
+        </p:txBody>
+      </p:sp>
+      <p:pic>
+        <p:nvPicPr>
+          <p:cNvPr id="4" name="Picture 3">
+            <a:extLst>
+              <a:ext uri="{FF2B5EF4-FFF2-40B4-BE49-F238E27FC236}">
+                <a16:creationId xmlns:a16="http://schemas.microsoft.com/office/drawing/2014/main" id="{EAD37276-ECA7-4D1E-8B55-8266DDF290DA}"/>
+              </a:ext>
+            </a:extLst>
+          </p:cNvPr>
+          <p:cNvPicPr>
+            <a:picLocks noChangeAspect="1"/>
+          </p:cNvPicPr>
+          <p:nvPr/>
+        </p:nvPicPr>
+        <p:blipFill>
+          <a:blip r:embed="rId2"/>
+          <a:stretch>
+            <a:fillRect/>
+          </a:stretch>
+        </p:blipFill>
+        <p:spPr>
+          <a:xfrm>
+            <a:off x="4247158" y="2528379"/>
+            <a:ext cx="7106642" cy="3648584"/>
+          </a:xfrm>
+          <a:prstGeom prst="rect">
+            <a:avLst/>
+          </a:prstGeom>
+        </p:spPr>
+      </p:pic>
+      <p:cxnSp>
+        <p:nvCxnSpPr>
+          <p:cNvPr id="6" name="Straight Connector 5">
+            <a:extLst>
+              <a:ext uri="{FF2B5EF4-FFF2-40B4-BE49-F238E27FC236}">
+                <a16:creationId xmlns:a16="http://schemas.microsoft.com/office/drawing/2014/main" id="{DF06766F-251A-4B2F-95D3-130BE465ED5C}"/>
+              </a:ext>
+            </a:extLst>
+          </p:cNvPr>
+          <p:cNvCxnSpPr>
+            <a:cxnSpLocks/>
+          </p:cNvCxnSpPr>
+          <p:nvPr/>
+        </p:nvCxnSpPr>
+        <p:spPr>
+          <a:xfrm>
+            <a:off x="4247158" y="3807372"/>
+            <a:ext cx="6977890" cy="0"/>
+          </a:xfrm>
+          <a:prstGeom prst="line">
+            <a:avLst/>
+          </a:prstGeom>
+        </p:spPr>
+        <p:style>
+          <a:lnRef idx="2">
+            <a:schemeClr val="dk1"/>
+          </a:lnRef>
+          <a:fillRef idx="0">
+            <a:schemeClr val="dk1"/>
+          </a:fillRef>
+          <a:effectRef idx="1">
+            <a:schemeClr val="dk1"/>
+          </a:effectRef>
+          <a:fontRef idx="minor">
+            <a:schemeClr val="tx1"/>
+          </a:fontRef>
+        </p:style>
+      </p:cxnSp>
+      <p:cxnSp>
+        <p:nvCxnSpPr>
+          <p:cNvPr id="8" name="Straight Connector 7">
+            <a:extLst>
+              <a:ext uri="{FF2B5EF4-FFF2-40B4-BE49-F238E27FC236}">
+                <a16:creationId xmlns:a16="http://schemas.microsoft.com/office/drawing/2014/main" id="{DEE2D3DA-5AC5-47CF-AA21-3501B4D30FFC}"/>
+              </a:ext>
+            </a:extLst>
+          </p:cNvPr>
+          <p:cNvCxnSpPr>
+            <a:cxnSpLocks/>
+          </p:cNvCxnSpPr>
+          <p:nvPr/>
+        </p:nvCxnSpPr>
+        <p:spPr>
+          <a:xfrm>
+            <a:off x="4163075" y="4897820"/>
+            <a:ext cx="6977890" cy="0"/>
+          </a:xfrm>
+          <a:prstGeom prst="line">
+            <a:avLst/>
+          </a:prstGeom>
+        </p:spPr>
+        <p:style>
+          <a:lnRef idx="2">
+            <a:schemeClr val="dk1"/>
+          </a:lnRef>
+          <a:fillRef idx="0">
+            <a:schemeClr val="dk1"/>
+          </a:fillRef>
+          <a:effectRef idx="1">
+            <a:schemeClr val="dk1"/>
+          </a:effectRef>
+          <a:fontRef idx="minor">
+            <a:schemeClr val="tx1"/>
+          </a:fontRef>
+        </p:style>
+      </p:cxnSp>
+      <p:cxnSp>
+        <p:nvCxnSpPr>
+          <p:cNvPr id="10" name="Straight Connector 9">
+            <a:extLst>
+              <a:ext uri="{FF2B5EF4-FFF2-40B4-BE49-F238E27FC236}">
+                <a16:creationId xmlns:a16="http://schemas.microsoft.com/office/drawing/2014/main" id="{0F8B0A56-586C-44AD-A7D3-D9C4D9FBD76F}"/>
+              </a:ext>
+            </a:extLst>
+          </p:cNvPr>
+          <p:cNvCxnSpPr>
+            <a:cxnSpLocks/>
+          </p:cNvCxnSpPr>
+          <p:nvPr/>
+        </p:nvCxnSpPr>
+        <p:spPr>
+          <a:xfrm>
+            <a:off x="10011104" y="2637247"/>
+            <a:ext cx="0" cy="3567770"/>
+          </a:xfrm>
+          <a:prstGeom prst="line">
+            <a:avLst/>
+          </a:prstGeom>
+        </p:spPr>
+        <p:style>
+          <a:lnRef idx="2">
+            <a:schemeClr val="dk1"/>
+          </a:lnRef>
+          <a:fillRef idx="0">
+            <a:schemeClr val="dk1"/>
+          </a:fillRef>
+          <a:effectRef idx="1">
+            <a:schemeClr val="dk1"/>
+          </a:effectRef>
+          <a:fontRef idx="minor">
+            <a:schemeClr val="tx1"/>
+          </a:fontRef>
+        </p:style>
+      </p:cxnSp>
+      <p:cxnSp>
+        <p:nvCxnSpPr>
+          <p:cNvPr id="15" name="Straight Connector 14">
+            <a:extLst>
+              <a:ext uri="{FF2B5EF4-FFF2-40B4-BE49-F238E27FC236}">
+                <a16:creationId xmlns:a16="http://schemas.microsoft.com/office/drawing/2014/main" id="{BD6C10FF-BF51-49E5-9B14-AE20E7854591}"/>
+              </a:ext>
+            </a:extLst>
+          </p:cNvPr>
+          <p:cNvCxnSpPr>
+            <a:cxnSpLocks/>
+          </p:cNvCxnSpPr>
+          <p:nvPr/>
+        </p:nvCxnSpPr>
+        <p:spPr>
+          <a:xfrm>
+            <a:off x="9065173" y="2687286"/>
+            <a:ext cx="0" cy="3623879"/>
+          </a:xfrm>
+          <a:prstGeom prst="line">
+            <a:avLst/>
+          </a:prstGeom>
+        </p:spPr>
+        <p:style>
+          <a:lnRef idx="2">
+            <a:schemeClr val="dk1"/>
+          </a:lnRef>
+          <a:fillRef idx="0">
+            <a:schemeClr val="dk1"/>
+          </a:fillRef>
+          <a:effectRef idx="1">
+            <a:schemeClr val="dk1"/>
+          </a:effectRef>
+          <a:fontRef idx="minor">
+            <a:schemeClr val="tx1"/>
+          </a:fontRef>
+        </p:style>
+      </p:cxnSp>
+      <p:cxnSp>
+        <p:nvCxnSpPr>
+          <p:cNvPr id="16" name="Straight Connector 15">
+            <a:extLst>
+              <a:ext uri="{FF2B5EF4-FFF2-40B4-BE49-F238E27FC236}">
+                <a16:creationId xmlns:a16="http://schemas.microsoft.com/office/drawing/2014/main" id="{2989531B-1F6F-412F-9B45-39C5B7F2F121}"/>
+              </a:ext>
+            </a:extLst>
+          </p:cNvPr>
+          <p:cNvCxnSpPr>
+            <a:cxnSpLocks/>
+          </p:cNvCxnSpPr>
+          <p:nvPr/>
+        </p:nvCxnSpPr>
+        <p:spPr>
+          <a:xfrm>
+            <a:off x="7689630" y="2734503"/>
+            <a:ext cx="0" cy="3623879"/>
+          </a:xfrm>
+          <a:prstGeom prst="line">
+            <a:avLst/>
+          </a:prstGeom>
+        </p:spPr>
+        <p:style>
+          <a:lnRef idx="2">
+            <a:schemeClr val="dk1"/>
+          </a:lnRef>
+          <a:fillRef idx="0">
+            <a:schemeClr val="dk1"/>
+          </a:fillRef>
+          <a:effectRef idx="1">
+            <a:schemeClr val="dk1"/>
+          </a:effectRef>
+          <a:fontRef idx="minor">
+            <a:schemeClr val="tx1"/>
+          </a:fontRef>
+        </p:style>
+      </p:cxnSp>
+      <p:cxnSp>
+        <p:nvCxnSpPr>
+          <p:cNvPr id="17" name="Straight Connector 16">
+            <a:extLst>
+              <a:ext uri="{FF2B5EF4-FFF2-40B4-BE49-F238E27FC236}">
+                <a16:creationId xmlns:a16="http://schemas.microsoft.com/office/drawing/2014/main" id="{09601D65-D059-46A7-BB04-1B6B4647E8E3}"/>
+              </a:ext>
+            </a:extLst>
+          </p:cNvPr>
+          <p:cNvCxnSpPr>
+            <a:cxnSpLocks/>
+          </p:cNvCxnSpPr>
+          <p:nvPr/>
+        </p:nvCxnSpPr>
+        <p:spPr>
+          <a:xfrm>
+            <a:off x="6447605" y="2714294"/>
+            <a:ext cx="0" cy="3623879"/>
+          </a:xfrm>
+          <a:prstGeom prst="line">
+            <a:avLst/>
+          </a:prstGeom>
+        </p:spPr>
+        <p:style>
+          <a:lnRef idx="2">
+            <a:schemeClr val="dk1"/>
+          </a:lnRef>
+          <a:fillRef idx="0">
+            <a:schemeClr val="dk1"/>
+          </a:fillRef>
+          <a:effectRef idx="1">
+            <a:schemeClr val="dk1"/>
+          </a:effectRef>
+          <a:fontRef idx="minor">
+            <a:schemeClr val="tx1"/>
+          </a:fontRef>
+        </p:style>
+      </p:cxnSp>
+      <p:cxnSp>
+        <p:nvCxnSpPr>
+          <p:cNvPr id="18" name="Straight Connector 17">
+            <a:extLst>
+              <a:ext uri="{FF2B5EF4-FFF2-40B4-BE49-F238E27FC236}">
+                <a16:creationId xmlns:a16="http://schemas.microsoft.com/office/drawing/2014/main" id="{5DDC963E-1911-4059-B9FA-451107628DDD}"/>
+              </a:ext>
+            </a:extLst>
+          </p:cNvPr>
+          <p:cNvCxnSpPr>
+            <a:cxnSpLocks/>
+          </p:cNvCxnSpPr>
+          <p:nvPr/>
+        </p:nvCxnSpPr>
+        <p:spPr>
+          <a:xfrm>
+            <a:off x="5506107" y="2714295"/>
+            <a:ext cx="0" cy="3623879"/>
+          </a:xfrm>
+          <a:prstGeom prst="line">
+            <a:avLst/>
+          </a:prstGeom>
+        </p:spPr>
+        <p:style>
+          <a:lnRef idx="2">
+            <a:schemeClr val="dk1"/>
+          </a:lnRef>
+          <a:fillRef idx="0">
+            <a:schemeClr val="dk1"/>
+          </a:fillRef>
+          <a:effectRef idx="1">
+            <a:schemeClr val="dk1"/>
+          </a:effectRef>
+          <a:fontRef idx="minor">
+            <a:schemeClr val="tx1"/>
+          </a:fontRef>
+        </p:style>
+      </p:cxnSp>
+      <p:sp>
+        <p:nvSpPr>
+          <p:cNvPr id="19" name="TextBox 18">
+            <a:extLst>
+              <a:ext uri="{FF2B5EF4-FFF2-40B4-BE49-F238E27FC236}">
+                <a16:creationId xmlns:a16="http://schemas.microsoft.com/office/drawing/2014/main" id="{84604CDD-88E8-43AB-83DE-AC629ABE2390}"/>
+              </a:ext>
+            </a:extLst>
+          </p:cNvPr>
+          <p:cNvSpPr txBox="1"/>
+          <p:nvPr/>
+        </p:nvSpPr>
+        <p:spPr>
+          <a:xfrm>
+            <a:off x="4247158" y="3097924"/>
+            <a:ext cx="703211" cy="369332"/>
+          </a:xfrm>
+          <a:prstGeom prst="rect">
+            <a:avLst/>
+          </a:prstGeom>
+          <a:noFill/>
+        </p:spPr>
+        <p:txBody>
+          <a:bodyPr wrap="square" rtlCol="0">
+            <a:spAutoFit/>
+          </a:bodyPr>
+          <a:lstStyle/>
+          <a:p>
+            <a:r>
+              <a:rPr lang="en-GB" dirty="0"/>
+              <a:t>1</a:t>
+            </a:r>
+          </a:p>
+        </p:txBody>
+      </p:sp>
+      <p:sp>
+        <p:nvSpPr>
+          <p:cNvPr id="20" name="TextBox 19">
+            <a:extLst>
+              <a:ext uri="{FF2B5EF4-FFF2-40B4-BE49-F238E27FC236}">
+                <a16:creationId xmlns:a16="http://schemas.microsoft.com/office/drawing/2014/main" id="{3667646F-39C2-4D93-B40E-CA6741E3C22C}"/>
+              </a:ext>
+            </a:extLst>
+          </p:cNvPr>
+          <p:cNvSpPr txBox="1"/>
+          <p:nvPr/>
+        </p:nvSpPr>
+        <p:spPr>
+          <a:xfrm>
+            <a:off x="5617976" y="3201011"/>
+            <a:ext cx="703211" cy="369332"/>
+          </a:xfrm>
+          <a:prstGeom prst="rect">
+            <a:avLst/>
+          </a:prstGeom>
+          <a:noFill/>
+        </p:spPr>
+        <p:txBody>
+          <a:bodyPr wrap="square" rtlCol="0">
+            <a:spAutoFit/>
+          </a:bodyPr>
+          <a:lstStyle/>
+          <a:p>
+            <a:r>
+              <a:rPr lang="en-GB" dirty="0"/>
+              <a:t>4</a:t>
+            </a:r>
+          </a:p>
+        </p:txBody>
+      </p:sp>
+      <p:sp>
+        <p:nvSpPr>
+          <p:cNvPr id="21" name="TextBox 20">
+            <a:extLst>
+              <a:ext uri="{FF2B5EF4-FFF2-40B4-BE49-F238E27FC236}">
+                <a16:creationId xmlns:a16="http://schemas.microsoft.com/office/drawing/2014/main" id="{A37927B6-FF05-4975-990B-D92919270D23}"/>
+              </a:ext>
+            </a:extLst>
+          </p:cNvPr>
+          <p:cNvSpPr txBox="1"/>
+          <p:nvPr/>
+        </p:nvSpPr>
+        <p:spPr>
+          <a:xfrm>
+            <a:off x="6796245" y="3201011"/>
+            <a:ext cx="703211" cy="369332"/>
+          </a:xfrm>
+          <a:prstGeom prst="rect">
+            <a:avLst/>
+          </a:prstGeom>
+          <a:noFill/>
+        </p:spPr>
+        <p:txBody>
+          <a:bodyPr wrap="square" rtlCol="0">
+            <a:spAutoFit/>
+          </a:bodyPr>
+          <a:lstStyle/>
+          <a:p>
+            <a:r>
+              <a:rPr lang="en-GB" dirty="0"/>
+              <a:t>7</a:t>
+            </a:r>
+          </a:p>
+        </p:txBody>
+      </p:sp>
+      <p:sp>
+        <p:nvSpPr>
+          <p:cNvPr id="22" name="TextBox 21">
+            <a:extLst>
+              <a:ext uri="{FF2B5EF4-FFF2-40B4-BE49-F238E27FC236}">
+                <a16:creationId xmlns:a16="http://schemas.microsoft.com/office/drawing/2014/main" id="{8EE15778-00EF-455E-8696-09A008C0991E}"/>
+              </a:ext>
+            </a:extLst>
+          </p:cNvPr>
+          <p:cNvSpPr txBox="1"/>
+          <p:nvPr/>
+        </p:nvSpPr>
+        <p:spPr>
+          <a:xfrm>
+            <a:off x="8263329" y="3135881"/>
+            <a:ext cx="703211" cy="369332"/>
+          </a:xfrm>
+          <a:prstGeom prst="rect">
+            <a:avLst/>
+          </a:prstGeom>
+          <a:noFill/>
+        </p:spPr>
+        <p:txBody>
+          <a:bodyPr wrap="square" rtlCol="0">
+            <a:spAutoFit/>
+          </a:bodyPr>
+          <a:lstStyle/>
+          <a:p>
+            <a:r>
+              <a:rPr lang="en-GB" dirty="0"/>
+              <a:t>10</a:t>
+            </a:r>
+          </a:p>
+        </p:txBody>
+      </p:sp>
+      <p:sp>
+        <p:nvSpPr>
+          <p:cNvPr id="23" name="TextBox 22">
+            <a:extLst>
+              <a:ext uri="{FF2B5EF4-FFF2-40B4-BE49-F238E27FC236}">
+                <a16:creationId xmlns:a16="http://schemas.microsoft.com/office/drawing/2014/main" id="{F2F920D0-C7ED-41FD-8DB6-22701183B730}"/>
+              </a:ext>
+            </a:extLst>
+          </p:cNvPr>
+          <p:cNvSpPr txBox="1"/>
+          <p:nvPr/>
+        </p:nvSpPr>
+        <p:spPr>
+          <a:xfrm>
+            <a:off x="9289565" y="3209923"/>
+            <a:ext cx="703211" cy="369332"/>
+          </a:xfrm>
+          <a:prstGeom prst="rect">
+            <a:avLst/>
+          </a:prstGeom>
+          <a:noFill/>
+        </p:spPr>
+        <p:txBody>
+          <a:bodyPr wrap="square" rtlCol="0">
+            <a:spAutoFit/>
+          </a:bodyPr>
+          <a:lstStyle/>
+          <a:p>
+            <a:r>
+              <a:rPr lang="en-GB" dirty="0"/>
+              <a:t>13</a:t>
+            </a:r>
+          </a:p>
+        </p:txBody>
+      </p:sp>
+      <p:sp>
+        <p:nvSpPr>
+          <p:cNvPr id="24" name="TextBox 23">
+            <a:extLst>
+              <a:ext uri="{FF2B5EF4-FFF2-40B4-BE49-F238E27FC236}">
+                <a16:creationId xmlns:a16="http://schemas.microsoft.com/office/drawing/2014/main" id="{F9993FA7-0EEC-4DA4-9F7E-26CD74BA12E6}"/>
+              </a:ext>
+            </a:extLst>
+          </p:cNvPr>
+          <p:cNvSpPr txBox="1"/>
+          <p:nvPr/>
+        </p:nvSpPr>
+        <p:spPr>
+          <a:xfrm>
+            <a:off x="10159560" y="3238501"/>
+            <a:ext cx="703211" cy="369332"/>
+          </a:xfrm>
+          <a:prstGeom prst="rect">
+            <a:avLst/>
+          </a:prstGeom>
+          <a:noFill/>
+        </p:spPr>
+        <p:txBody>
+          <a:bodyPr wrap="square" rtlCol="0">
+            <a:spAutoFit/>
+          </a:bodyPr>
+          <a:lstStyle/>
+          <a:p>
+            <a:r>
+              <a:rPr lang="en-GB" dirty="0"/>
+              <a:t>16</a:t>
+            </a:r>
+          </a:p>
+        </p:txBody>
+      </p:sp>
+      <p:sp>
+        <p:nvSpPr>
+          <p:cNvPr id="26" name="TextBox 25">
+            <a:extLst>
+              <a:ext uri="{FF2B5EF4-FFF2-40B4-BE49-F238E27FC236}">
+                <a16:creationId xmlns:a16="http://schemas.microsoft.com/office/drawing/2014/main" id="{87E5AC0C-8D18-4DAE-BAE3-407FCD60F725}"/>
+              </a:ext>
+            </a:extLst>
+          </p:cNvPr>
+          <p:cNvSpPr txBox="1"/>
+          <p:nvPr/>
+        </p:nvSpPr>
+        <p:spPr>
+          <a:xfrm>
+            <a:off x="4309159" y="3876405"/>
+            <a:ext cx="703211" cy="369332"/>
+          </a:xfrm>
+          <a:prstGeom prst="rect">
+            <a:avLst/>
+          </a:prstGeom>
+          <a:noFill/>
+        </p:spPr>
+        <p:txBody>
+          <a:bodyPr wrap="square" rtlCol="0">
+            <a:spAutoFit/>
+          </a:bodyPr>
+          <a:lstStyle/>
+          <a:p>
+            <a:r>
+              <a:rPr lang="en-GB" dirty="0"/>
+              <a:t>2</a:t>
+            </a:r>
+          </a:p>
+        </p:txBody>
+      </p:sp>
+      <p:sp>
+        <p:nvSpPr>
+          <p:cNvPr id="27" name="TextBox 26">
+            <a:extLst>
+              <a:ext uri="{FF2B5EF4-FFF2-40B4-BE49-F238E27FC236}">
+                <a16:creationId xmlns:a16="http://schemas.microsoft.com/office/drawing/2014/main" id="{23834A67-CC00-4BD1-AEE3-1E156B1D8A78}"/>
+              </a:ext>
+            </a:extLst>
+          </p:cNvPr>
+          <p:cNvSpPr txBox="1"/>
+          <p:nvPr/>
+        </p:nvSpPr>
+        <p:spPr>
+          <a:xfrm>
+            <a:off x="5744394" y="4260527"/>
+            <a:ext cx="703211" cy="369332"/>
+          </a:xfrm>
+          <a:prstGeom prst="rect">
+            <a:avLst/>
+          </a:prstGeom>
+          <a:noFill/>
+        </p:spPr>
+        <p:txBody>
+          <a:bodyPr wrap="square" rtlCol="0">
+            <a:spAutoFit/>
+          </a:bodyPr>
+          <a:lstStyle/>
+          <a:p>
+            <a:r>
+              <a:rPr lang="en-GB" dirty="0"/>
+              <a:t>5</a:t>
+            </a:r>
+          </a:p>
+        </p:txBody>
+      </p:sp>
+      <p:sp>
+        <p:nvSpPr>
+          <p:cNvPr id="28" name="TextBox 27">
+            <a:extLst>
+              <a:ext uri="{FF2B5EF4-FFF2-40B4-BE49-F238E27FC236}">
+                <a16:creationId xmlns:a16="http://schemas.microsoft.com/office/drawing/2014/main" id="{FD4705E4-4721-475D-B660-314B825A46C1}"/>
+              </a:ext>
+            </a:extLst>
+          </p:cNvPr>
+          <p:cNvSpPr txBox="1"/>
+          <p:nvPr/>
+        </p:nvSpPr>
+        <p:spPr>
+          <a:xfrm>
+            <a:off x="6912766" y="4274790"/>
+            <a:ext cx="703211" cy="369332"/>
+          </a:xfrm>
+          <a:prstGeom prst="rect">
+            <a:avLst/>
+          </a:prstGeom>
+          <a:noFill/>
+        </p:spPr>
+        <p:txBody>
+          <a:bodyPr wrap="square" rtlCol="0">
+            <a:spAutoFit/>
+          </a:bodyPr>
+          <a:lstStyle/>
+          <a:p>
+            <a:r>
+              <a:rPr lang="en-GB" dirty="0"/>
+              <a:t>8</a:t>
+            </a:r>
+          </a:p>
+        </p:txBody>
+      </p:sp>
+      <p:sp>
+        <p:nvSpPr>
+          <p:cNvPr id="29" name="TextBox 28">
+            <a:extLst>
+              <a:ext uri="{FF2B5EF4-FFF2-40B4-BE49-F238E27FC236}">
+                <a16:creationId xmlns:a16="http://schemas.microsoft.com/office/drawing/2014/main" id="{5C15D800-75D9-4F9A-B77E-C9455B220BAD}"/>
+              </a:ext>
+            </a:extLst>
+          </p:cNvPr>
+          <p:cNvSpPr txBox="1"/>
+          <p:nvPr/>
+        </p:nvSpPr>
+        <p:spPr>
+          <a:xfrm>
+            <a:off x="8163258" y="3901635"/>
+            <a:ext cx="703211" cy="369332"/>
+          </a:xfrm>
+          <a:prstGeom prst="rect">
+            <a:avLst/>
+          </a:prstGeom>
+          <a:noFill/>
+        </p:spPr>
+        <p:txBody>
+          <a:bodyPr wrap="square" rtlCol="0">
+            <a:spAutoFit/>
+          </a:bodyPr>
+          <a:lstStyle/>
+          <a:p>
+            <a:r>
+              <a:rPr lang="en-GB" dirty="0"/>
+              <a:t>11</a:t>
+            </a:r>
+          </a:p>
+        </p:txBody>
+      </p:sp>
+      <p:sp>
+        <p:nvSpPr>
+          <p:cNvPr id="30" name="TextBox 29">
+            <a:extLst>
+              <a:ext uri="{FF2B5EF4-FFF2-40B4-BE49-F238E27FC236}">
+                <a16:creationId xmlns:a16="http://schemas.microsoft.com/office/drawing/2014/main" id="{8DDEEC84-5245-45F0-9175-B5C1EF714C43}"/>
+              </a:ext>
+            </a:extLst>
+          </p:cNvPr>
+          <p:cNvSpPr txBox="1"/>
+          <p:nvPr/>
+        </p:nvSpPr>
+        <p:spPr>
+          <a:xfrm>
+            <a:off x="9263069" y="4140795"/>
+            <a:ext cx="703211" cy="369332"/>
+          </a:xfrm>
+          <a:prstGeom prst="rect">
+            <a:avLst/>
+          </a:prstGeom>
+          <a:noFill/>
+        </p:spPr>
+        <p:txBody>
+          <a:bodyPr wrap="square" rtlCol="0">
+            <a:spAutoFit/>
+          </a:bodyPr>
+          <a:lstStyle/>
+          <a:p>
+            <a:r>
+              <a:rPr lang="en-GB" dirty="0"/>
+              <a:t>14</a:t>
+            </a:r>
+          </a:p>
+        </p:txBody>
+      </p:sp>
+      <p:sp>
+        <p:nvSpPr>
+          <p:cNvPr id="31" name="TextBox 30">
+            <a:extLst>
+              <a:ext uri="{FF2B5EF4-FFF2-40B4-BE49-F238E27FC236}">
+                <a16:creationId xmlns:a16="http://schemas.microsoft.com/office/drawing/2014/main" id="{E96FB42E-0D74-4F8B-A1C8-AE5947B7FF46}"/>
+              </a:ext>
+            </a:extLst>
+          </p:cNvPr>
+          <p:cNvSpPr txBox="1"/>
+          <p:nvPr/>
+        </p:nvSpPr>
+        <p:spPr>
+          <a:xfrm>
+            <a:off x="10242659" y="4129893"/>
+            <a:ext cx="703211" cy="369332"/>
+          </a:xfrm>
+          <a:prstGeom prst="rect">
+            <a:avLst/>
+          </a:prstGeom>
+          <a:noFill/>
+        </p:spPr>
+        <p:txBody>
+          <a:bodyPr wrap="square" rtlCol="0">
+            <a:spAutoFit/>
+          </a:bodyPr>
+          <a:lstStyle/>
+          <a:p>
+            <a:r>
+              <a:rPr lang="en-GB" dirty="0"/>
+              <a:t>17</a:t>
+            </a:r>
+          </a:p>
+        </p:txBody>
+      </p:sp>
+      <p:sp>
+        <p:nvSpPr>
+          <p:cNvPr id="33" name="TextBox 32">
+            <a:extLst>
+              <a:ext uri="{FF2B5EF4-FFF2-40B4-BE49-F238E27FC236}">
+                <a16:creationId xmlns:a16="http://schemas.microsoft.com/office/drawing/2014/main" id="{67076EB3-A8BF-4D40-8C7B-E1BF5E8F2E91}"/>
+              </a:ext>
+            </a:extLst>
+          </p:cNvPr>
+          <p:cNvSpPr txBox="1"/>
+          <p:nvPr/>
+        </p:nvSpPr>
+        <p:spPr>
+          <a:xfrm>
+            <a:off x="4329601" y="5032758"/>
+            <a:ext cx="703211" cy="369332"/>
+          </a:xfrm>
+          <a:prstGeom prst="rect">
+            <a:avLst/>
+          </a:prstGeom>
+          <a:noFill/>
+        </p:spPr>
+        <p:txBody>
+          <a:bodyPr wrap="square" rtlCol="0">
+            <a:spAutoFit/>
+          </a:bodyPr>
+          <a:lstStyle/>
+          <a:p>
+            <a:r>
+              <a:rPr lang="en-GB" dirty="0"/>
+              <a:t>3</a:t>
+            </a:r>
+          </a:p>
+        </p:txBody>
+      </p:sp>
+      <p:sp>
+        <p:nvSpPr>
+          <p:cNvPr id="34" name="TextBox 33">
+            <a:extLst>
+              <a:ext uri="{FF2B5EF4-FFF2-40B4-BE49-F238E27FC236}">
+                <a16:creationId xmlns:a16="http://schemas.microsoft.com/office/drawing/2014/main" id="{6343ED35-86E9-4361-B597-5847A9C5A1BA}"/>
+              </a:ext>
+            </a:extLst>
+          </p:cNvPr>
+          <p:cNvSpPr txBox="1"/>
+          <p:nvPr/>
+        </p:nvSpPr>
+        <p:spPr>
+          <a:xfrm>
+            <a:off x="5721572" y="5050065"/>
+            <a:ext cx="703211" cy="369332"/>
+          </a:xfrm>
+          <a:prstGeom prst="rect">
+            <a:avLst/>
+          </a:prstGeom>
+          <a:noFill/>
+        </p:spPr>
+        <p:txBody>
+          <a:bodyPr wrap="square" rtlCol="0">
+            <a:spAutoFit/>
+          </a:bodyPr>
+          <a:lstStyle/>
+          <a:p>
+            <a:r>
+              <a:rPr lang="en-GB" dirty="0"/>
+              <a:t>6</a:t>
+            </a:r>
+          </a:p>
+        </p:txBody>
+      </p:sp>
+      <p:sp>
+        <p:nvSpPr>
+          <p:cNvPr id="35" name="TextBox 34">
+            <a:extLst>
+              <a:ext uri="{FF2B5EF4-FFF2-40B4-BE49-F238E27FC236}">
+                <a16:creationId xmlns:a16="http://schemas.microsoft.com/office/drawing/2014/main" id="{E5213F00-1E65-4734-8DC7-8C97355A0F09}"/>
+              </a:ext>
+            </a:extLst>
+          </p:cNvPr>
+          <p:cNvSpPr txBox="1"/>
+          <p:nvPr/>
+        </p:nvSpPr>
+        <p:spPr>
+          <a:xfrm>
+            <a:off x="6873991" y="5125938"/>
+            <a:ext cx="703211" cy="369332"/>
+          </a:xfrm>
+          <a:prstGeom prst="rect">
+            <a:avLst/>
+          </a:prstGeom>
+          <a:noFill/>
+        </p:spPr>
+        <p:txBody>
+          <a:bodyPr wrap="square" rtlCol="0">
+            <a:spAutoFit/>
+          </a:bodyPr>
+          <a:lstStyle/>
+          <a:p>
+            <a:r>
+              <a:rPr lang="en-GB" dirty="0"/>
+              <a:t>9</a:t>
+            </a:r>
+          </a:p>
+        </p:txBody>
+      </p:sp>
+      <p:sp>
+        <p:nvSpPr>
+          <p:cNvPr id="36" name="TextBox 35">
+            <a:extLst>
+              <a:ext uri="{FF2B5EF4-FFF2-40B4-BE49-F238E27FC236}">
+                <a16:creationId xmlns:a16="http://schemas.microsoft.com/office/drawing/2014/main" id="{B66050AC-597B-4B08-9325-997A4B41241E}"/>
+              </a:ext>
+            </a:extLst>
+          </p:cNvPr>
+          <p:cNvSpPr txBox="1"/>
+          <p:nvPr/>
+        </p:nvSpPr>
+        <p:spPr>
+          <a:xfrm>
+            <a:off x="8126135" y="5111750"/>
+            <a:ext cx="703211" cy="369332"/>
+          </a:xfrm>
+          <a:prstGeom prst="rect">
+            <a:avLst/>
+          </a:prstGeom>
+          <a:noFill/>
+        </p:spPr>
+        <p:txBody>
+          <a:bodyPr wrap="square" rtlCol="0">
+            <a:spAutoFit/>
+          </a:bodyPr>
+          <a:lstStyle/>
+          <a:p>
+            <a:r>
+              <a:rPr lang="en-GB" dirty="0"/>
+              <a:t>12</a:t>
+            </a:r>
+          </a:p>
+        </p:txBody>
+      </p:sp>
+      <p:sp>
+        <p:nvSpPr>
+          <p:cNvPr id="37" name="TextBox 36">
+            <a:extLst>
+              <a:ext uri="{FF2B5EF4-FFF2-40B4-BE49-F238E27FC236}">
+                <a16:creationId xmlns:a16="http://schemas.microsoft.com/office/drawing/2014/main" id="{933EE839-8648-43A5-8C92-34E7AA6D4229}"/>
+              </a:ext>
+            </a:extLst>
+          </p:cNvPr>
+          <p:cNvSpPr txBox="1"/>
+          <p:nvPr/>
+        </p:nvSpPr>
+        <p:spPr>
+          <a:xfrm>
+            <a:off x="9192543" y="5155585"/>
+            <a:ext cx="703211" cy="369332"/>
+          </a:xfrm>
+          <a:prstGeom prst="rect">
+            <a:avLst/>
+          </a:prstGeom>
+          <a:noFill/>
+        </p:spPr>
+        <p:txBody>
+          <a:bodyPr wrap="square" rtlCol="0">
+            <a:spAutoFit/>
+          </a:bodyPr>
+          <a:lstStyle/>
+          <a:p>
+            <a:r>
+              <a:rPr lang="en-GB" dirty="0"/>
+              <a:t>15</a:t>
+            </a:r>
+          </a:p>
+        </p:txBody>
+      </p:sp>
+      <p:sp>
+        <p:nvSpPr>
+          <p:cNvPr id="38" name="TextBox 37">
+            <a:extLst>
+              <a:ext uri="{FF2B5EF4-FFF2-40B4-BE49-F238E27FC236}">
+                <a16:creationId xmlns:a16="http://schemas.microsoft.com/office/drawing/2014/main" id="{B0ECD1A3-3944-446B-94EE-28E2F872C072}"/>
+              </a:ext>
+            </a:extLst>
+          </p:cNvPr>
+          <p:cNvSpPr txBox="1"/>
+          <p:nvPr/>
+        </p:nvSpPr>
+        <p:spPr>
+          <a:xfrm>
+            <a:off x="10358345" y="5039196"/>
+            <a:ext cx="703211" cy="369332"/>
+          </a:xfrm>
+          <a:prstGeom prst="rect">
+            <a:avLst/>
+          </a:prstGeom>
+          <a:noFill/>
+        </p:spPr>
+        <p:txBody>
+          <a:bodyPr wrap="square" rtlCol="0">
+            <a:spAutoFit/>
+          </a:bodyPr>
+          <a:lstStyle/>
+          <a:p>
+            <a:r>
+              <a:rPr lang="en-GB" dirty="0"/>
+              <a:t>18</a:t>
+            </a:r>
+          </a:p>
+        </p:txBody>
+      </p:sp>
+    </p:spTree>
+    <p:extLst>
+      <p:ext uri="{BB962C8B-B14F-4D97-AF65-F5344CB8AC3E}">
+        <p14:creationId xmlns:p14="http://schemas.microsoft.com/office/powerpoint/2010/main" val="2530204748"/>
+      </p:ext>
+    </p:extLst>
+  </p:cSld>
+  <p:clrMapOvr>
+    <a:masterClrMapping/>
+  </p:clrMapOvr>
+</p:sld>
+</file>
+
+<file path=ppt/slides/slide21.xml><?xml version="1.0" encoding="utf-8"?>
+<p:sld xmlns:a="http://schemas.openxmlformats.org/drawingml/2006/main" xmlns:r="http://schemas.openxmlformats.org/officeDocument/2006/relationships" xmlns:p="http://schemas.openxmlformats.org/presentationml/2006/main">
+  <p:cSld>
+    <p:spTree>
+      <p:nvGrpSpPr>
+        <p:cNvPr id="1" name=""/>
+        <p:cNvGrpSpPr/>
+        <p:nvPr/>
+      </p:nvGrpSpPr>
+      <p:grpSpPr>
+        <a:xfrm>
+          <a:off x="0" y="0"/>
+          <a:ext cx="0" cy="0"/>
+          <a:chOff x="0" y="0"/>
+          <a:chExt cx="0" cy="0"/>
+        </a:xfrm>
+      </p:grpSpPr>
+      <p:sp>
+        <p:nvSpPr>
+          <p:cNvPr id="2" name="Title 1">
+            <a:extLst>
+              <a:ext uri="{FF2B5EF4-FFF2-40B4-BE49-F238E27FC236}">
+                <a16:creationId xmlns:a16="http://schemas.microsoft.com/office/drawing/2014/main" id="{28E8FE16-9B9B-41EB-A5FD-6E054166D721}"/>
+              </a:ext>
+            </a:extLst>
+          </p:cNvPr>
+          <p:cNvSpPr>
+            <a:spLocks noGrp="1"/>
+          </p:cNvSpPr>
+          <p:nvPr>
+            <p:ph type="title"/>
+          </p:nvPr>
+        </p:nvSpPr>
+        <p:spPr/>
+        <p:txBody>
+          <a:bodyPr/>
+          <a:lstStyle/>
+          <a:p>
+            <a:r>
+              <a:rPr lang="en-GB" dirty="0"/>
+              <a:t>Map 3</a:t>
+            </a:r>
+          </a:p>
+        </p:txBody>
+      </p:sp>
+      <p:sp>
+        <p:nvSpPr>
+          <p:cNvPr id="3" name="Content Placeholder 2">
+            <a:extLst>
+              <a:ext uri="{FF2B5EF4-FFF2-40B4-BE49-F238E27FC236}">
+                <a16:creationId xmlns:a16="http://schemas.microsoft.com/office/drawing/2014/main" id="{5B0F6000-608D-4743-8425-07BFA07E287D}"/>
+              </a:ext>
+            </a:extLst>
+          </p:cNvPr>
+          <p:cNvSpPr>
+            <a:spLocks noGrp="1"/>
+          </p:cNvSpPr>
+          <p:nvPr>
+            <p:ph idx="1"/>
+          </p:nvPr>
+        </p:nvSpPr>
+        <p:spPr/>
+        <p:txBody>
+          <a:bodyPr/>
+          <a:lstStyle/>
+          <a:p>
+            <a:endParaRPr lang="en-GB"/>
+          </a:p>
+        </p:txBody>
+      </p:sp>
+      <p:pic>
+        <p:nvPicPr>
+          <p:cNvPr id="4" name="Picture 3">
+            <a:extLst>
+              <a:ext uri="{FF2B5EF4-FFF2-40B4-BE49-F238E27FC236}">
+                <a16:creationId xmlns:a16="http://schemas.microsoft.com/office/drawing/2014/main" id="{7F2BE67C-174B-4DE8-9BDC-EFB6B205D31B}"/>
+              </a:ext>
+            </a:extLst>
+          </p:cNvPr>
+          <p:cNvPicPr>
+            <a:picLocks noChangeAspect="1"/>
+          </p:cNvPicPr>
+          <p:nvPr/>
+        </p:nvPicPr>
+        <p:blipFill>
+          <a:blip r:embed="rId2"/>
+          <a:stretch>
+            <a:fillRect/>
+          </a:stretch>
+        </p:blipFill>
+        <p:spPr>
+          <a:xfrm>
+            <a:off x="5624446" y="2881235"/>
+            <a:ext cx="3180507" cy="3694527"/>
+          </a:xfrm>
+          <a:prstGeom prst="rect">
+            <a:avLst/>
+          </a:prstGeom>
+        </p:spPr>
+      </p:pic>
+      <p:cxnSp>
+        <p:nvCxnSpPr>
+          <p:cNvPr id="6" name="Straight Connector 5">
+            <a:extLst>
+              <a:ext uri="{FF2B5EF4-FFF2-40B4-BE49-F238E27FC236}">
+                <a16:creationId xmlns:a16="http://schemas.microsoft.com/office/drawing/2014/main" id="{065B01DF-315F-4C1D-8F7C-EFF40C8E3B2C}"/>
+              </a:ext>
+            </a:extLst>
+          </p:cNvPr>
+          <p:cNvCxnSpPr>
+            <a:cxnSpLocks/>
+          </p:cNvCxnSpPr>
+          <p:nvPr/>
+        </p:nvCxnSpPr>
+        <p:spPr>
+          <a:xfrm>
+            <a:off x="7062952" y="3429000"/>
+            <a:ext cx="0" cy="2514600"/>
+          </a:xfrm>
+          <a:prstGeom prst="line">
+            <a:avLst/>
+          </a:prstGeom>
+        </p:spPr>
+        <p:style>
+          <a:lnRef idx="2">
+            <a:schemeClr val="dk1"/>
+          </a:lnRef>
+          <a:fillRef idx="0">
+            <a:schemeClr val="dk1"/>
+          </a:fillRef>
+          <a:effectRef idx="1">
+            <a:schemeClr val="dk1"/>
+          </a:effectRef>
+          <a:fontRef idx="minor">
+            <a:schemeClr val="tx1"/>
+          </a:fontRef>
+        </p:style>
+      </p:cxnSp>
+      <p:sp>
+        <p:nvSpPr>
+          <p:cNvPr id="8" name="TextBox 7">
+            <a:extLst>
+              <a:ext uri="{FF2B5EF4-FFF2-40B4-BE49-F238E27FC236}">
+                <a16:creationId xmlns:a16="http://schemas.microsoft.com/office/drawing/2014/main" id="{35872913-8847-4F9E-9D83-CDB2DF7472BF}"/>
+              </a:ext>
+            </a:extLst>
+          </p:cNvPr>
+          <p:cNvSpPr txBox="1"/>
+          <p:nvPr/>
+        </p:nvSpPr>
+        <p:spPr>
+          <a:xfrm>
+            <a:off x="5770179" y="4240924"/>
+            <a:ext cx="906516" cy="369332"/>
+          </a:xfrm>
+          <a:prstGeom prst="rect">
+            <a:avLst/>
+          </a:prstGeom>
+          <a:noFill/>
+        </p:spPr>
+        <p:txBody>
+          <a:bodyPr wrap="square" rtlCol="0">
+            <a:spAutoFit/>
+          </a:bodyPr>
+          <a:lstStyle/>
+          <a:p>
+            <a:r>
+              <a:rPr lang="en-GB" dirty="0"/>
+              <a:t>1</a:t>
+            </a:r>
+          </a:p>
+        </p:txBody>
+      </p:sp>
+      <p:sp>
+        <p:nvSpPr>
+          <p:cNvPr id="9" name="TextBox 8">
+            <a:extLst>
+              <a:ext uri="{FF2B5EF4-FFF2-40B4-BE49-F238E27FC236}">
+                <a16:creationId xmlns:a16="http://schemas.microsoft.com/office/drawing/2014/main" id="{C452B7B1-8953-4EEB-B642-E3B6F70E8471}"/>
+              </a:ext>
+            </a:extLst>
+          </p:cNvPr>
+          <p:cNvSpPr txBox="1"/>
+          <p:nvPr/>
+        </p:nvSpPr>
+        <p:spPr>
+          <a:xfrm>
+            <a:off x="7208685" y="4166832"/>
+            <a:ext cx="906516" cy="369332"/>
+          </a:xfrm>
+          <a:prstGeom prst="rect">
+            <a:avLst/>
+          </a:prstGeom>
+          <a:noFill/>
+        </p:spPr>
+        <p:txBody>
+          <a:bodyPr wrap="square" rtlCol="0">
+            <a:spAutoFit/>
+          </a:bodyPr>
+          <a:lstStyle/>
+          <a:p>
+            <a:r>
+              <a:rPr lang="en-GB" dirty="0"/>
+              <a:t>2</a:t>
+            </a:r>
+          </a:p>
+        </p:txBody>
+      </p:sp>
+    </p:spTree>
+    <p:extLst>
+      <p:ext uri="{BB962C8B-B14F-4D97-AF65-F5344CB8AC3E}">
+        <p14:creationId xmlns:p14="http://schemas.microsoft.com/office/powerpoint/2010/main" val="1023305478"/>
+      </p:ext>
+    </p:extLst>
+  </p:cSld>
+  <p:clrMapOvr>
+    <a:masterClrMapping/>
+  </p:clrMapOvr>
+</p:sld>
+</file>
+
+<file path=ppt/slides/slide22.xml><?xml version="1.0" encoding="utf-8"?>
+<p:sld xmlns:a="http://schemas.openxmlformats.org/drawingml/2006/main" xmlns:r="http://schemas.openxmlformats.org/officeDocument/2006/relationships" xmlns:p="http://schemas.openxmlformats.org/presentationml/2006/main">
+  <p:cSld>
+    <p:spTree>
+      <p:nvGrpSpPr>
+        <p:cNvPr id="1" name=""/>
+        <p:cNvGrpSpPr/>
+        <p:nvPr/>
+      </p:nvGrpSpPr>
+      <p:grpSpPr>
+        <a:xfrm>
+          <a:off x="0" y="0"/>
+          <a:ext cx="0" cy="0"/>
+          <a:chOff x="0" y="0"/>
+          <a:chExt cx="0" cy="0"/>
+        </a:xfrm>
+      </p:grpSpPr>
+      <p:sp>
+        <p:nvSpPr>
+          <p:cNvPr id="2" name="Title 1">
+            <a:extLst>
+              <a:ext uri="{FF2B5EF4-FFF2-40B4-BE49-F238E27FC236}">
+                <a16:creationId xmlns:a16="http://schemas.microsoft.com/office/drawing/2014/main" id="{E0DF440C-CBAA-4926-875F-E91C0A93F987}"/>
+              </a:ext>
+            </a:extLst>
+          </p:cNvPr>
+          <p:cNvSpPr>
+            <a:spLocks noGrp="1"/>
+          </p:cNvSpPr>
+          <p:nvPr>
+            <p:ph type="title"/>
+          </p:nvPr>
+        </p:nvSpPr>
+        <p:spPr/>
+        <p:txBody>
+          <a:bodyPr/>
+          <a:lstStyle/>
+          <a:p>
+            <a:r>
+              <a:rPr lang="en-GB" dirty="0"/>
+              <a:t>Map 4</a:t>
+            </a:r>
+          </a:p>
+        </p:txBody>
+      </p:sp>
+      <p:sp>
+        <p:nvSpPr>
+          <p:cNvPr id="3" name="Content Placeholder 2">
+            <a:extLst>
+              <a:ext uri="{FF2B5EF4-FFF2-40B4-BE49-F238E27FC236}">
+                <a16:creationId xmlns:a16="http://schemas.microsoft.com/office/drawing/2014/main" id="{248AF5B5-DDA3-4CBD-BF32-D3CB4F28339B}"/>
+              </a:ext>
+            </a:extLst>
+          </p:cNvPr>
+          <p:cNvSpPr>
+            <a:spLocks noGrp="1"/>
+          </p:cNvSpPr>
+          <p:nvPr>
+            <p:ph idx="1"/>
+          </p:nvPr>
+        </p:nvSpPr>
+        <p:spPr/>
+        <p:txBody>
+          <a:bodyPr/>
+          <a:lstStyle/>
+          <a:p>
+            <a:endParaRPr lang="en-GB" dirty="0"/>
+          </a:p>
+        </p:txBody>
+      </p:sp>
+      <p:pic>
+        <p:nvPicPr>
+          <p:cNvPr id="4" name="Picture 3">
+            <a:extLst>
+              <a:ext uri="{FF2B5EF4-FFF2-40B4-BE49-F238E27FC236}">
+                <a16:creationId xmlns:a16="http://schemas.microsoft.com/office/drawing/2014/main" id="{B8BE933B-86DC-4B0B-941A-9E0C22BB3737}"/>
+              </a:ext>
+            </a:extLst>
+          </p:cNvPr>
+          <p:cNvPicPr>
+            <a:picLocks noChangeAspect="1"/>
+          </p:cNvPicPr>
+          <p:nvPr/>
+        </p:nvPicPr>
+        <p:blipFill>
+          <a:blip r:embed="rId2"/>
+          <a:stretch>
+            <a:fillRect/>
+          </a:stretch>
+        </p:blipFill>
+        <p:spPr>
+          <a:xfrm>
+            <a:off x="8703715" y="220717"/>
+            <a:ext cx="1723804" cy="6461620"/>
+          </a:xfrm>
+          <a:prstGeom prst="rect">
+            <a:avLst/>
+          </a:prstGeom>
+        </p:spPr>
+      </p:pic>
+      <p:cxnSp>
+        <p:nvCxnSpPr>
+          <p:cNvPr id="6" name="Straight Connector 5">
+            <a:extLst>
+              <a:ext uri="{FF2B5EF4-FFF2-40B4-BE49-F238E27FC236}">
+                <a16:creationId xmlns:a16="http://schemas.microsoft.com/office/drawing/2014/main" id="{80FF7AF9-622A-42F1-B465-69FF78B9BE44}"/>
+              </a:ext>
+            </a:extLst>
+          </p:cNvPr>
+          <p:cNvCxnSpPr/>
+          <p:nvPr/>
+        </p:nvCxnSpPr>
+        <p:spPr>
+          <a:xfrm>
+            <a:off x="9569669" y="365125"/>
+            <a:ext cx="0" cy="3923096"/>
+          </a:xfrm>
+          <a:prstGeom prst="line">
+            <a:avLst/>
+          </a:prstGeom>
+        </p:spPr>
+        <p:style>
+          <a:lnRef idx="2">
+            <a:schemeClr val="dk1"/>
+          </a:lnRef>
+          <a:fillRef idx="0">
+            <a:schemeClr val="dk1"/>
+          </a:fillRef>
+          <a:effectRef idx="1">
+            <a:schemeClr val="dk1"/>
+          </a:effectRef>
+          <a:fontRef idx="minor">
+            <a:schemeClr val="tx1"/>
+          </a:fontRef>
+        </p:style>
+      </p:cxnSp>
+      <p:cxnSp>
+        <p:nvCxnSpPr>
+          <p:cNvPr id="8" name="Straight Connector 7">
+            <a:extLst>
+              <a:ext uri="{FF2B5EF4-FFF2-40B4-BE49-F238E27FC236}">
+                <a16:creationId xmlns:a16="http://schemas.microsoft.com/office/drawing/2014/main" id="{EE6CA95D-9175-4854-AEE4-72E33C76877F}"/>
+              </a:ext>
+            </a:extLst>
+          </p:cNvPr>
+          <p:cNvCxnSpPr>
+            <a:cxnSpLocks/>
+          </p:cNvCxnSpPr>
+          <p:nvPr/>
+        </p:nvCxnSpPr>
+        <p:spPr>
+          <a:xfrm>
+            <a:off x="8703715" y="1690688"/>
+            <a:ext cx="1723804" cy="59284"/>
+          </a:xfrm>
+          <a:prstGeom prst="line">
+            <a:avLst/>
+          </a:prstGeom>
+        </p:spPr>
+        <p:style>
+          <a:lnRef idx="1">
+            <a:schemeClr val="dk1"/>
+          </a:lnRef>
+          <a:fillRef idx="0">
+            <a:schemeClr val="dk1"/>
+          </a:fillRef>
+          <a:effectRef idx="0">
+            <a:schemeClr val="dk1"/>
+          </a:effectRef>
+          <a:fontRef idx="minor">
+            <a:schemeClr val="tx1"/>
+          </a:fontRef>
+        </p:style>
+      </p:cxnSp>
+      <p:cxnSp>
+        <p:nvCxnSpPr>
+          <p:cNvPr id="11" name="Straight Connector 10">
+            <a:extLst>
+              <a:ext uri="{FF2B5EF4-FFF2-40B4-BE49-F238E27FC236}">
+                <a16:creationId xmlns:a16="http://schemas.microsoft.com/office/drawing/2014/main" id="{55F0D979-E0E9-4FB3-BFD6-1352116A63A4}"/>
+              </a:ext>
+            </a:extLst>
+          </p:cNvPr>
+          <p:cNvCxnSpPr>
+            <a:cxnSpLocks/>
+          </p:cNvCxnSpPr>
+          <p:nvPr/>
+        </p:nvCxnSpPr>
+        <p:spPr>
+          <a:xfrm>
+            <a:off x="8711598" y="3016251"/>
+            <a:ext cx="1723804" cy="59284"/>
+          </a:xfrm>
+          <a:prstGeom prst="line">
+            <a:avLst/>
+          </a:prstGeom>
+        </p:spPr>
+        <p:style>
+          <a:lnRef idx="1">
+            <a:schemeClr val="dk1"/>
+          </a:lnRef>
+          <a:fillRef idx="0">
+            <a:schemeClr val="dk1"/>
+          </a:fillRef>
+          <a:effectRef idx="0">
+            <a:schemeClr val="dk1"/>
+          </a:effectRef>
+          <a:fontRef idx="minor">
+            <a:schemeClr val="tx1"/>
+          </a:fontRef>
+        </p:style>
+      </p:cxnSp>
+      <p:cxnSp>
+        <p:nvCxnSpPr>
+          <p:cNvPr id="12" name="Straight Connector 11">
+            <a:extLst>
+              <a:ext uri="{FF2B5EF4-FFF2-40B4-BE49-F238E27FC236}">
+                <a16:creationId xmlns:a16="http://schemas.microsoft.com/office/drawing/2014/main" id="{C0C44FDF-33ED-4A59-B6F5-1ED186689830}"/>
+              </a:ext>
+            </a:extLst>
+          </p:cNvPr>
+          <p:cNvCxnSpPr>
+            <a:cxnSpLocks/>
+          </p:cNvCxnSpPr>
+          <p:nvPr/>
+        </p:nvCxnSpPr>
+        <p:spPr>
+          <a:xfrm>
+            <a:off x="8414681" y="4237121"/>
+            <a:ext cx="1723804" cy="59284"/>
+          </a:xfrm>
+          <a:prstGeom prst="line">
+            <a:avLst/>
+          </a:prstGeom>
+        </p:spPr>
+        <p:style>
+          <a:lnRef idx="1">
+            <a:schemeClr val="dk1"/>
+          </a:lnRef>
+          <a:fillRef idx="0">
+            <a:schemeClr val="dk1"/>
+          </a:fillRef>
+          <a:effectRef idx="0">
+            <a:schemeClr val="dk1"/>
+          </a:effectRef>
+          <a:fontRef idx="minor">
+            <a:schemeClr val="tx1"/>
+          </a:fontRef>
+        </p:style>
+      </p:cxnSp>
+      <p:cxnSp>
+        <p:nvCxnSpPr>
+          <p:cNvPr id="13" name="Straight Connector 12">
+            <a:extLst>
+              <a:ext uri="{FF2B5EF4-FFF2-40B4-BE49-F238E27FC236}">
+                <a16:creationId xmlns:a16="http://schemas.microsoft.com/office/drawing/2014/main" id="{715FFA01-F338-417E-A9E9-C16E4DA86914}"/>
+              </a:ext>
+            </a:extLst>
+          </p:cNvPr>
+          <p:cNvCxnSpPr>
+            <a:cxnSpLocks/>
+          </p:cNvCxnSpPr>
+          <p:nvPr/>
+        </p:nvCxnSpPr>
+        <p:spPr>
+          <a:xfrm>
+            <a:off x="8414681" y="5207042"/>
+            <a:ext cx="1723804" cy="59284"/>
+          </a:xfrm>
+          <a:prstGeom prst="line">
+            <a:avLst/>
+          </a:prstGeom>
+        </p:spPr>
+        <p:style>
+          <a:lnRef idx="1">
+            <a:schemeClr val="dk1"/>
+          </a:lnRef>
+          <a:fillRef idx="0">
+            <a:schemeClr val="dk1"/>
+          </a:fillRef>
+          <a:effectRef idx="0">
+            <a:schemeClr val="dk1"/>
+          </a:effectRef>
+          <a:fontRef idx="minor">
+            <a:schemeClr val="tx1"/>
+          </a:fontRef>
+        </p:style>
+      </p:cxnSp>
+      <p:sp>
+        <p:nvSpPr>
+          <p:cNvPr id="14" name="TextBox 13">
+            <a:extLst>
+              <a:ext uri="{FF2B5EF4-FFF2-40B4-BE49-F238E27FC236}">
+                <a16:creationId xmlns:a16="http://schemas.microsoft.com/office/drawing/2014/main" id="{34A098B0-933E-4AC2-8C7C-5169E5CA9DC0}"/>
+              </a:ext>
+            </a:extLst>
+          </p:cNvPr>
+          <p:cNvSpPr txBox="1"/>
+          <p:nvPr/>
+        </p:nvSpPr>
+        <p:spPr>
+          <a:xfrm>
+            <a:off x="8978462" y="811924"/>
+            <a:ext cx="409899" cy="369332"/>
+          </a:xfrm>
+          <a:prstGeom prst="rect">
+            <a:avLst/>
+          </a:prstGeom>
+          <a:noFill/>
+        </p:spPr>
+        <p:txBody>
+          <a:bodyPr wrap="square" rtlCol="0">
+            <a:spAutoFit/>
+          </a:bodyPr>
+          <a:lstStyle/>
+          <a:p>
+            <a:r>
+              <a:rPr lang="en-GB" dirty="0"/>
+              <a:t>1</a:t>
+            </a:r>
+          </a:p>
+        </p:txBody>
+      </p:sp>
+      <p:sp>
+        <p:nvSpPr>
+          <p:cNvPr id="15" name="TextBox 14">
+            <a:extLst>
+              <a:ext uri="{FF2B5EF4-FFF2-40B4-BE49-F238E27FC236}">
+                <a16:creationId xmlns:a16="http://schemas.microsoft.com/office/drawing/2014/main" id="{8241AD25-0EBE-4630-82D9-DF885DEBE35C}"/>
+              </a:ext>
+            </a:extLst>
+          </p:cNvPr>
+          <p:cNvSpPr txBox="1"/>
+          <p:nvPr/>
+        </p:nvSpPr>
+        <p:spPr>
+          <a:xfrm>
+            <a:off x="9015253" y="2044045"/>
+            <a:ext cx="409899" cy="369332"/>
+          </a:xfrm>
+          <a:prstGeom prst="rect">
+            <a:avLst/>
+          </a:prstGeom>
+          <a:noFill/>
+        </p:spPr>
+        <p:txBody>
+          <a:bodyPr wrap="square" rtlCol="0">
+            <a:spAutoFit/>
+          </a:bodyPr>
+          <a:lstStyle/>
+          <a:p>
+            <a:r>
+              <a:rPr lang="en-GB" dirty="0"/>
+              <a:t>3</a:t>
+            </a:r>
+          </a:p>
+        </p:txBody>
+      </p:sp>
+      <p:sp>
+        <p:nvSpPr>
+          <p:cNvPr id="16" name="TextBox 15">
+            <a:extLst>
+              <a:ext uri="{FF2B5EF4-FFF2-40B4-BE49-F238E27FC236}">
+                <a16:creationId xmlns:a16="http://schemas.microsoft.com/office/drawing/2014/main" id="{AC780F16-A16D-4351-B9D3-82F7A285E967}"/>
+              </a:ext>
+            </a:extLst>
+          </p:cNvPr>
+          <p:cNvSpPr txBox="1"/>
+          <p:nvPr/>
+        </p:nvSpPr>
+        <p:spPr>
+          <a:xfrm>
+            <a:off x="9000854" y="3451527"/>
+            <a:ext cx="409899" cy="369332"/>
+          </a:xfrm>
+          <a:prstGeom prst="rect">
+            <a:avLst/>
+          </a:prstGeom>
+          <a:noFill/>
+        </p:spPr>
+        <p:txBody>
+          <a:bodyPr wrap="square" rtlCol="0">
+            <a:spAutoFit/>
+          </a:bodyPr>
+          <a:lstStyle/>
+          <a:p>
+            <a:r>
+              <a:rPr lang="en-GB" dirty="0"/>
+              <a:t>5</a:t>
+            </a:r>
+          </a:p>
+        </p:txBody>
+      </p:sp>
+      <p:sp>
+        <p:nvSpPr>
+          <p:cNvPr id="17" name="TextBox 16">
+            <a:extLst>
+              <a:ext uri="{FF2B5EF4-FFF2-40B4-BE49-F238E27FC236}">
+                <a16:creationId xmlns:a16="http://schemas.microsoft.com/office/drawing/2014/main" id="{BFD6911F-6728-442D-BBD3-3B95E9AD4387}"/>
+              </a:ext>
+            </a:extLst>
+          </p:cNvPr>
+          <p:cNvSpPr txBox="1"/>
+          <p:nvPr/>
+        </p:nvSpPr>
+        <p:spPr>
+          <a:xfrm>
+            <a:off x="8874562" y="4322744"/>
+            <a:ext cx="409899" cy="369332"/>
+          </a:xfrm>
+          <a:prstGeom prst="rect">
+            <a:avLst/>
+          </a:prstGeom>
+          <a:noFill/>
+        </p:spPr>
+        <p:txBody>
+          <a:bodyPr wrap="square" rtlCol="0">
+            <a:spAutoFit/>
+          </a:bodyPr>
+          <a:lstStyle/>
+          <a:p>
+            <a:r>
+              <a:rPr lang="en-GB" dirty="0"/>
+              <a:t>7</a:t>
+            </a:r>
+          </a:p>
+        </p:txBody>
+      </p:sp>
+      <p:sp>
+        <p:nvSpPr>
+          <p:cNvPr id="18" name="TextBox 17">
+            <a:extLst>
+              <a:ext uri="{FF2B5EF4-FFF2-40B4-BE49-F238E27FC236}">
+                <a16:creationId xmlns:a16="http://schemas.microsoft.com/office/drawing/2014/main" id="{525238F3-6656-4575-A3ED-0B936028C810}"/>
+              </a:ext>
+            </a:extLst>
+          </p:cNvPr>
+          <p:cNvSpPr txBox="1"/>
+          <p:nvPr/>
+        </p:nvSpPr>
+        <p:spPr>
+          <a:xfrm>
+            <a:off x="8977201" y="5341979"/>
+            <a:ext cx="409899" cy="369332"/>
+          </a:xfrm>
+          <a:prstGeom prst="rect">
+            <a:avLst/>
+          </a:prstGeom>
+          <a:noFill/>
+        </p:spPr>
+        <p:txBody>
+          <a:bodyPr wrap="square" rtlCol="0">
+            <a:spAutoFit/>
+          </a:bodyPr>
+          <a:lstStyle/>
+          <a:p>
+            <a:r>
+              <a:rPr lang="en-GB" dirty="0"/>
+              <a:t>8</a:t>
+            </a:r>
+          </a:p>
+        </p:txBody>
+      </p:sp>
+      <p:sp>
+        <p:nvSpPr>
+          <p:cNvPr id="19" name="TextBox 18">
+            <a:extLst>
+              <a:ext uri="{FF2B5EF4-FFF2-40B4-BE49-F238E27FC236}">
+                <a16:creationId xmlns:a16="http://schemas.microsoft.com/office/drawing/2014/main" id="{18E885FC-2C0F-4965-B5F6-EB014D2FBF93}"/>
+              </a:ext>
+            </a:extLst>
+          </p:cNvPr>
+          <p:cNvSpPr txBox="1"/>
+          <p:nvPr/>
+        </p:nvSpPr>
+        <p:spPr>
+          <a:xfrm>
+            <a:off x="9750978" y="884744"/>
+            <a:ext cx="409899" cy="369332"/>
+          </a:xfrm>
+          <a:prstGeom prst="rect">
+            <a:avLst/>
+          </a:prstGeom>
+          <a:noFill/>
+        </p:spPr>
+        <p:txBody>
+          <a:bodyPr wrap="square" rtlCol="0">
+            <a:spAutoFit/>
+          </a:bodyPr>
+          <a:lstStyle/>
+          <a:p>
+            <a:r>
+              <a:rPr lang="en-GB" dirty="0"/>
+              <a:t>2</a:t>
+            </a:r>
+          </a:p>
+        </p:txBody>
+      </p:sp>
+      <p:sp>
+        <p:nvSpPr>
+          <p:cNvPr id="20" name="TextBox 19">
+            <a:extLst>
+              <a:ext uri="{FF2B5EF4-FFF2-40B4-BE49-F238E27FC236}">
+                <a16:creationId xmlns:a16="http://schemas.microsoft.com/office/drawing/2014/main" id="{20CE2EC7-7C5B-4E90-8434-8B60573A57F0}"/>
+              </a:ext>
+            </a:extLst>
+          </p:cNvPr>
+          <p:cNvSpPr txBox="1"/>
+          <p:nvPr/>
+        </p:nvSpPr>
+        <p:spPr>
+          <a:xfrm>
+            <a:off x="9728586" y="2127300"/>
+            <a:ext cx="409899" cy="369332"/>
+          </a:xfrm>
+          <a:prstGeom prst="rect">
+            <a:avLst/>
+          </a:prstGeom>
+          <a:noFill/>
+        </p:spPr>
+        <p:txBody>
+          <a:bodyPr wrap="square" rtlCol="0">
+            <a:spAutoFit/>
+          </a:bodyPr>
+          <a:lstStyle/>
+          <a:p>
+            <a:r>
+              <a:rPr lang="en-GB" dirty="0"/>
+              <a:t>4</a:t>
+            </a:r>
+          </a:p>
+        </p:txBody>
+      </p:sp>
+      <p:sp>
+        <p:nvSpPr>
+          <p:cNvPr id="21" name="TextBox 20">
+            <a:extLst>
+              <a:ext uri="{FF2B5EF4-FFF2-40B4-BE49-F238E27FC236}">
+                <a16:creationId xmlns:a16="http://schemas.microsoft.com/office/drawing/2014/main" id="{20E3922C-A357-4BE8-AAA4-A6C9ECDE5A19}"/>
+              </a:ext>
+            </a:extLst>
+          </p:cNvPr>
+          <p:cNvSpPr txBox="1"/>
+          <p:nvPr/>
+        </p:nvSpPr>
+        <p:spPr>
+          <a:xfrm>
+            <a:off x="9728586" y="3471662"/>
+            <a:ext cx="409899" cy="369332"/>
+          </a:xfrm>
+          <a:prstGeom prst="rect">
+            <a:avLst/>
+          </a:prstGeom>
+          <a:noFill/>
+        </p:spPr>
+        <p:txBody>
+          <a:bodyPr wrap="square" rtlCol="0">
+            <a:spAutoFit/>
+          </a:bodyPr>
+          <a:lstStyle/>
+          <a:p>
+            <a:r>
+              <a:rPr lang="en-GB" dirty="0"/>
+              <a:t>6</a:t>
+            </a:r>
+          </a:p>
+        </p:txBody>
+      </p:sp>
+    </p:spTree>
+    <p:extLst>
+      <p:ext uri="{BB962C8B-B14F-4D97-AF65-F5344CB8AC3E}">
+        <p14:creationId xmlns:p14="http://schemas.microsoft.com/office/powerpoint/2010/main" val="3109032532"/>
+      </p:ext>
+    </p:extLst>
+  </p:cSld>
+  <p:clrMapOvr>
+    <a:masterClrMapping/>
+  </p:clrMapOvr>
+</p:sld>
+</file>
+
+<file path=ppt/slides/slide23.xml><?xml version="1.0" encoding="utf-8"?>
 <p:sld xmlns:a="http://schemas.openxmlformats.org/drawingml/2006/main" xmlns:r="http://schemas.openxmlformats.org/officeDocument/2006/relationships" xmlns:p="http://schemas.openxmlformats.org/presentationml/2006/main">
   <p:cSld>
     <p:spTree>

</xml_diff>